<commit_message>
Chapters 8 to 10
</commit_message>
<xml_diff>
--- a/Class Slides 2022/Class 9.pptx
+++ b/Class Slides 2022/Class 9.pptx
@@ -5,24 +5,30 @@
     <p:sldMasterId id="2147483648" r:id="rId1"/>
   </p:sldMasterIdLst>
   <p:notesMasterIdLst>
-    <p:notesMasterId r:id="rId17"/>
+    <p:notesMasterId r:id="rId23"/>
   </p:notesMasterIdLst>
   <p:sldIdLst>
     <p:sldId id="256" r:id="rId2"/>
-    <p:sldId id="257" r:id="rId3"/>
-    <p:sldId id="352" r:id="rId4"/>
-    <p:sldId id="354" r:id="rId5"/>
-    <p:sldId id="338" r:id="rId6"/>
-    <p:sldId id="360" r:id="rId7"/>
-    <p:sldId id="340" r:id="rId8"/>
-    <p:sldId id="357" r:id="rId9"/>
-    <p:sldId id="358" r:id="rId10"/>
-    <p:sldId id="272" r:id="rId11"/>
-    <p:sldId id="346" r:id="rId12"/>
-    <p:sldId id="359" r:id="rId13"/>
-    <p:sldId id="284" r:id="rId14"/>
-    <p:sldId id="356" r:id="rId15"/>
-    <p:sldId id="355" r:id="rId16"/>
+    <p:sldId id="350" r:id="rId3"/>
+    <p:sldId id="351" r:id="rId4"/>
+    <p:sldId id="277" r:id="rId5"/>
+    <p:sldId id="361" r:id="rId6"/>
+    <p:sldId id="341" r:id="rId7"/>
+    <p:sldId id="342" r:id="rId8"/>
+    <p:sldId id="257" r:id="rId9"/>
+    <p:sldId id="352" r:id="rId10"/>
+    <p:sldId id="354" r:id="rId11"/>
+    <p:sldId id="338" r:id="rId12"/>
+    <p:sldId id="360" r:id="rId13"/>
+    <p:sldId id="340" r:id="rId14"/>
+    <p:sldId id="357" r:id="rId15"/>
+    <p:sldId id="358" r:id="rId16"/>
+    <p:sldId id="272" r:id="rId17"/>
+    <p:sldId id="346" r:id="rId18"/>
+    <p:sldId id="359" r:id="rId19"/>
+    <p:sldId id="284" r:id="rId20"/>
+    <p:sldId id="356" r:id="rId21"/>
+    <p:sldId id="355" r:id="rId22"/>
   </p:sldIdLst>
   <p:sldSz cx="12192000" cy="6858000"/>
   <p:notesSz cx="6858000" cy="9144000"/>
@@ -211,7 +217,7 @@
           <a:p>
             <a:fld id="{61DA0A6F-04A1-4018-814E-B14B9F1D8F64}" type="datetimeFigureOut">
               <a:rPr lang="en-US" smtClean="0"/>
-              <a:t>10/7/2022</a:t>
+              <a:t>1/11/2024</a:t>
             </a:fld>
             <a:endParaRPr lang="en-US"/>
           </a:p>
@@ -497,6 +503,96 @@
       </p:grpSpPr>
       <p:sp>
         <p:nvSpPr>
+          <p:cNvPr id="2" name="Slide Image Placeholder 1"/>
+          <p:cNvSpPr>
+            <a:spLocks noGrp="1" noRot="1" noChangeAspect="1"/>
+          </p:cNvSpPr>
+          <p:nvPr>
+            <p:ph type="sldImg"/>
+          </p:nvPr>
+        </p:nvSpPr>
+        <p:spPr/>
+      </p:sp>
+      <p:sp>
+        <p:nvSpPr>
+          <p:cNvPr id="3" name="Notes Placeholder 2"/>
+          <p:cNvSpPr>
+            <a:spLocks noGrp="1"/>
+          </p:cNvSpPr>
+          <p:nvPr>
+            <p:ph type="body" idx="1"/>
+          </p:nvPr>
+        </p:nvSpPr>
+        <p:spPr/>
+        <p:txBody>
+          <a:bodyPr/>
+          <a:lstStyle/>
+          <a:p>
+            <a:endParaRPr lang="en-US" dirty="0"/>
+          </a:p>
+        </p:txBody>
+      </p:sp>
+      <p:sp>
+        <p:nvSpPr>
+          <p:cNvPr id="4" name="Slide Number Placeholder 3"/>
+          <p:cNvSpPr>
+            <a:spLocks noGrp="1"/>
+          </p:cNvSpPr>
+          <p:nvPr>
+            <p:ph type="sldNum" sz="quarter" idx="5"/>
+          </p:nvPr>
+        </p:nvSpPr>
+        <p:spPr/>
+        <p:txBody>
+          <a:bodyPr/>
+          <a:lstStyle/>
+          <a:p>
+            <a:pPr>
+              <a:defRPr/>
+            </a:pPr>
+            <a:fld id="{A209961E-0A26-45CB-B2A9-D09862605DC9}" type="slidenum">
+              <a:rPr lang="en-US" smtClean="0"/>
+              <a:pPr>
+                <a:defRPr/>
+              </a:pPr>
+              <a:t>7</a:t>
+            </a:fld>
+            <a:endParaRPr lang="en-US"/>
+          </a:p>
+        </p:txBody>
+      </p:sp>
+    </p:spTree>
+    <p:extLst>
+      <p:ext uri="{BB962C8B-B14F-4D97-AF65-F5344CB8AC3E}">
+        <p14:creationId xmlns:p14="http://schemas.microsoft.com/office/powerpoint/2010/main" val="3026861373"/>
+      </p:ext>
+    </p:extLst>
+  </p:cSld>
+  <p:clrMapOvr>
+    <a:masterClrMapping/>
+  </p:clrMapOvr>
+</p:notes>
+</file>
+
+<file path=ppt/notesSlides/notesSlide2.xml><?xml version="1.0" encoding="utf-8"?>
+<p:notes xmlns:a="http://schemas.openxmlformats.org/drawingml/2006/main" xmlns:r="http://schemas.openxmlformats.org/officeDocument/2006/relationships" xmlns:p="http://schemas.openxmlformats.org/presentationml/2006/main">
+  <p:cSld>
+    <p:spTree>
+      <p:nvGrpSpPr>
+        <p:cNvPr id="1" name=""/>
+        <p:cNvGrpSpPr/>
+        <p:nvPr/>
+      </p:nvGrpSpPr>
+      <p:grpSpPr>
+        <a:xfrm>
+          <a:off x="0" y="0"/>
+          <a:ext cx="0" cy="0"/>
+          <a:chOff x="0" y="0"/>
+          <a:chExt cx="0" cy="0"/>
+        </a:xfrm>
+      </p:grpSpPr>
+      <p:sp>
+        <p:nvSpPr>
           <p:cNvPr id="20482" name="Rectangle 7"/>
           <p:cNvSpPr>
             <a:spLocks noGrp="1" noChangeArrowheads="1"/>
@@ -539,7 +635,7 @@
                   <a:spcPct val="0"/>
                 </a:spcAft>
               </a:pPr>
-              <a:t>10</a:t>
+              <a:t>16</a:t>
             </a:fld>
             <a:endParaRPr lang="en-US"/>
           </a:p>
@@ -752,7 +848,7 @@
           <a:p>
             <a:fld id="{658CE488-0C45-4C90-8B4B-0A64883178EB}" type="datetimeFigureOut">
               <a:rPr lang="en-US" smtClean="0"/>
-              <a:t>10/7/2022</a:t>
+              <a:t>1/11/2024</a:t>
             </a:fld>
             <a:endParaRPr lang="en-US"/>
           </a:p>
@@ -950,7 +1046,7 @@
           <a:p>
             <a:fld id="{658CE488-0C45-4C90-8B4B-0A64883178EB}" type="datetimeFigureOut">
               <a:rPr lang="en-US" smtClean="0"/>
-              <a:t>10/7/2022</a:t>
+              <a:t>1/11/2024</a:t>
             </a:fld>
             <a:endParaRPr lang="en-US"/>
           </a:p>
@@ -1158,7 +1254,7 @@
           <a:p>
             <a:fld id="{658CE488-0C45-4C90-8B4B-0A64883178EB}" type="datetimeFigureOut">
               <a:rPr lang="en-US" smtClean="0"/>
-              <a:t>10/7/2022</a:t>
+              <a:t>1/11/2024</a:t>
             </a:fld>
             <a:endParaRPr lang="en-US"/>
           </a:p>
@@ -1356,7 +1452,7 @@
           <a:p>
             <a:fld id="{658CE488-0C45-4C90-8B4B-0A64883178EB}" type="datetimeFigureOut">
               <a:rPr lang="en-US" smtClean="0"/>
-              <a:t>10/7/2022</a:t>
+              <a:t>1/11/2024</a:t>
             </a:fld>
             <a:endParaRPr lang="en-US"/>
           </a:p>
@@ -1631,7 +1727,7 @@
           <a:p>
             <a:fld id="{658CE488-0C45-4C90-8B4B-0A64883178EB}" type="datetimeFigureOut">
               <a:rPr lang="en-US" smtClean="0"/>
-              <a:t>10/7/2022</a:t>
+              <a:t>1/11/2024</a:t>
             </a:fld>
             <a:endParaRPr lang="en-US"/>
           </a:p>
@@ -1896,7 +1992,7 @@
           <a:p>
             <a:fld id="{658CE488-0C45-4C90-8B4B-0A64883178EB}" type="datetimeFigureOut">
               <a:rPr lang="en-US" smtClean="0"/>
-              <a:t>10/7/2022</a:t>
+              <a:t>1/11/2024</a:t>
             </a:fld>
             <a:endParaRPr lang="en-US"/>
           </a:p>
@@ -2308,7 +2404,7 @@
           <a:p>
             <a:fld id="{658CE488-0C45-4C90-8B4B-0A64883178EB}" type="datetimeFigureOut">
               <a:rPr lang="en-US" smtClean="0"/>
-              <a:t>10/7/2022</a:t>
+              <a:t>1/11/2024</a:t>
             </a:fld>
             <a:endParaRPr lang="en-US"/>
           </a:p>
@@ -2449,7 +2545,7 @@
           <a:p>
             <a:fld id="{658CE488-0C45-4C90-8B4B-0A64883178EB}" type="datetimeFigureOut">
               <a:rPr lang="en-US" smtClean="0"/>
-              <a:t>10/7/2022</a:t>
+              <a:t>1/11/2024</a:t>
             </a:fld>
             <a:endParaRPr lang="en-US"/>
           </a:p>
@@ -2562,7 +2658,7 @@
           <a:p>
             <a:fld id="{658CE488-0C45-4C90-8B4B-0A64883178EB}" type="datetimeFigureOut">
               <a:rPr lang="en-US" smtClean="0"/>
-              <a:t>10/7/2022</a:t>
+              <a:t>1/11/2024</a:t>
             </a:fld>
             <a:endParaRPr lang="en-US"/>
           </a:p>
@@ -2873,7 +2969,7 @@
           <a:p>
             <a:fld id="{658CE488-0C45-4C90-8B4B-0A64883178EB}" type="datetimeFigureOut">
               <a:rPr lang="en-US" smtClean="0"/>
-              <a:t>10/7/2022</a:t>
+              <a:t>1/11/2024</a:t>
             </a:fld>
             <a:endParaRPr lang="en-US"/>
           </a:p>
@@ -3161,7 +3257,7 @@
           <a:p>
             <a:fld id="{658CE488-0C45-4C90-8B4B-0A64883178EB}" type="datetimeFigureOut">
               <a:rPr lang="en-US" smtClean="0"/>
-              <a:t>10/7/2022</a:t>
+              <a:t>1/11/2024</a:t>
             </a:fld>
             <a:endParaRPr lang="en-US"/>
           </a:p>
@@ -3402,7 +3498,7 @@
           <a:p>
             <a:fld id="{658CE488-0C45-4C90-8B4B-0A64883178EB}" type="datetimeFigureOut">
               <a:rPr lang="en-US" smtClean="0"/>
-              <a:t>10/7/2022</a:t>
+              <a:t>1/11/2024</a:t>
             </a:fld>
             <a:endParaRPr lang="en-US"/>
           </a:p>
@@ -3842,7 +3938,7 @@
           <a:p>
             <a:r>
               <a:rPr lang="en-US" dirty="0"/>
-              <a:t>205 Oct 10, Class 9</a:t>
+              <a:t>205 Jan 22, Class 9</a:t>
             </a:r>
           </a:p>
         </p:txBody>
@@ -3870,8 +3966,40 @@
           <a:p>
             <a:r>
               <a:rPr lang="en-US" dirty="0"/>
-              <a:t>Research Ethics</a:t>
-            </a:r>
+              <a:t>Chapter 8, Research Ethics</a:t>
+            </a:r>
+          </a:p>
+          <a:p>
+            <a:pPr lvl="1"/>
+            <a:r>
+              <a:rPr lang="en-US" dirty="0"/>
+              <a:t>Fair and equitable treatment of human research participants</a:t>
+            </a:r>
+          </a:p>
+          <a:p>
+            <a:endParaRPr lang="en-US" dirty="0"/>
+          </a:p>
+          <a:p>
+            <a:r>
+              <a:rPr lang="en-US" dirty="0"/>
+              <a:t>Gino &amp; </a:t>
+            </a:r>
+            <a:r>
+              <a:rPr lang="en-US" dirty="0" err="1"/>
+              <a:t>Wiltermuth</a:t>
+            </a:r>
+            <a:r>
+              <a:rPr lang="en-US" dirty="0"/>
+              <a:t> (2014)</a:t>
+            </a:r>
+          </a:p>
+          <a:p>
+            <a:pPr lvl="1"/>
+            <a:r>
+              <a:rPr lang="en-US"/>
+              <a:t>Evil Genius</a:t>
+            </a:r>
+            <a:endParaRPr lang="en-US" dirty="0"/>
           </a:p>
         </p:txBody>
       </p:sp>
@@ -3907,9 +4035,15 @@
       </p:grpSpPr>
       <p:sp>
         <p:nvSpPr>
-          <p:cNvPr id="6146" name="Rectangle 2"/>
-          <p:cNvSpPr>
-            <a:spLocks noGrp="1" noChangeArrowheads="1"/>
+          <p:cNvPr id="4" name="Title 3">
+            <a:extLst>
+              <a:ext uri="{FF2B5EF4-FFF2-40B4-BE49-F238E27FC236}">
+                <a16:creationId xmlns:a16="http://schemas.microsoft.com/office/drawing/2014/main" id="{4689CD80-ECD2-32A4-4A57-433E21A363D5}"/>
+              </a:ext>
+            </a:extLst>
+          </p:cNvPr>
+          <p:cNvSpPr>
+            <a:spLocks noGrp="1"/>
           </p:cNvSpPr>
           <p:nvPr>
             <p:ph type="title"/>
@@ -3922,84 +4056,117 @@
           <a:p>
             <a:r>
               <a:rPr lang="en-US" dirty="0"/>
-              <a:t>Ethical scientific practice</a:t>
-            </a:r>
-          </a:p>
-        </p:txBody>
-      </p:sp>
-      <p:sp>
-        <p:nvSpPr>
-          <p:cNvPr id="6147" name="Rectangle 3"/>
-          <p:cNvSpPr>
-            <a:spLocks noGrp="1" noChangeArrowheads="1"/>
-          </p:cNvSpPr>
-          <p:nvPr>
-            <p:ph type="body" idx="1"/>
-          </p:nvPr>
-        </p:nvSpPr>
-        <p:spPr/>
-        <p:txBody>
-          <a:bodyPr/>
-          <a:lstStyle/>
-          <a:p>
-            <a:r>
-              <a:rPr lang="en-US" dirty="0"/>
-              <a:t>Assure fair treatment of participants</a:t>
-            </a:r>
-          </a:p>
-          <a:p>
-            <a:r>
-              <a:rPr lang="en-US" dirty="0"/>
-              <a:t>Institutional Review Board (IRB)</a:t>
-            </a:r>
-          </a:p>
-          <a:p>
-            <a:pPr lvl="1"/>
-            <a:r>
-              <a:rPr lang="en-US" dirty="0"/>
-              <a:t>Reviews all formal research</a:t>
-            </a:r>
-          </a:p>
-          <a:p>
-            <a:pPr lvl="1"/>
-            <a:r>
-              <a:rPr lang="en-US" dirty="0"/>
-              <a:t>Risk/benefit analysis</a:t>
-            </a:r>
-          </a:p>
-          <a:p>
-            <a:r>
-              <a:rPr lang="en-US" dirty="0"/>
-              <a:t>Informed Consent</a:t>
-            </a:r>
-          </a:p>
-          <a:p>
-            <a:pPr lvl="1"/>
-            <a:r>
-              <a:rPr lang="en-US" dirty="0"/>
-              <a:t>Right to withdraw</a:t>
-            </a:r>
-          </a:p>
-          <a:p>
-            <a:pPr lvl="1"/>
-            <a:r>
-              <a:rPr lang="en-US" dirty="0"/>
-              <a:t>Full disclosure: risks, benefits, procedure</a:t>
-            </a:r>
-          </a:p>
-          <a:p>
-            <a:pPr lvl="1"/>
-            <a:r>
-              <a:rPr lang="en-US" dirty="0"/>
-              <a:t>Privacy</a:t>
-            </a:r>
-          </a:p>
-        </p:txBody>
-      </p:sp>
+              <a:t>Conclusions</a:t>
+            </a:r>
+          </a:p>
+        </p:txBody>
+      </p:sp>
+      <p:sp>
+        <p:nvSpPr>
+          <p:cNvPr id="3" name="Content Placeholder 2">
+            <a:extLst>
+              <a:ext uri="{FF2B5EF4-FFF2-40B4-BE49-F238E27FC236}">
+                <a16:creationId xmlns:a16="http://schemas.microsoft.com/office/drawing/2014/main" id="{314B1870-E958-9E21-FD6F-B94995B62D61}"/>
+              </a:ext>
+            </a:extLst>
+          </p:cNvPr>
+          <p:cNvSpPr>
+            <a:spLocks noGrp="1"/>
+          </p:cNvSpPr>
+          <p:nvPr>
+            <p:ph sz="half" idx="1"/>
+          </p:nvPr>
+        </p:nvSpPr>
+        <p:spPr/>
+        <p:txBody>
+          <a:bodyPr/>
+          <a:lstStyle/>
+          <a:p>
+            <a:r>
+              <a:rPr lang="en-US" sz="1800" dirty="0">
+                <a:solidFill>
+                  <a:srgbClr val="2D3B45"/>
+                </a:solidFill>
+                <a:effectLst/>
+                <a:latin typeface="Lato" panose="020F0502020204030203" pitchFamily="34" charset="0"/>
+                <a:ea typeface="Times New Roman" panose="02020603050405020304" pitchFamily="18" charset="0"/>
+              </a:rPr>
+              <a:t>Experiments 4 and 5 use yet additional novel manipulations of honesty to measure creativity effects.  From the General Discussion, how do the authors explain the overall set of their findings with respect to the theoretical relationship between dishonesty and creativity via a mechanism?  Give an example of a speculative point made that goes beyond the statement of results.</a:t>
+            </a:r>
+            <a:endParaRPr lang="en-US" sz="1800" dirty="0">
+              <a:effectLst/>
+              <a:latin typeface="Times New Roman" panose="02020603050405020304" pitchFamily="18" charset="0"/>
+              <a:ea typeface="Times New Roman" panose="02020603050405020304" pitchFamily="18" charset="0"/>
+            </a:endParaRPr>
+          </a:p>
+          <a:p>
+            <a:endParaRPr lang="en-US" dirty="0"/>
+          </a:p>
+        </p:txBody>
+      </p:sp>
+      <p:pic>
+        <p:nvPicPr>
+          <p:cNvPr id="7" name="Content Placeholder 6">
+            <a:extLst>
+              <a:ext uri="{FF2B5EF4-FFF2-40B4-BE49-F238E27FC236}">
+                <a16:creationId xmlns:a16="http://schemas.microsoft.com/office/drawing/2014/main" id="{641F0D9F-F7F3-F194-D590-27A1DDA4C585}"/>
+              </a:ext>
+            </a:extLst>
+          </p:cNvPr>
+          <p:cNvPicPr>
+            <a:picLocks noGrp="1" noChangeAspect="1"/>
+          </p:cNvPicPr>
+          <p:nvPr>
+            <p:ph sz="half" idx="2"/>
+          </p:nvPr>
+        </p:nvPicPr>
+        <p:blipFill>
+          <a:blip r:embed="rId2"/>
+          <a:stretch>
+            <a:fillRect/>
+          </a:stretch>
+        </p:blipFill>
+        <p:spPr>
+          <a:xfrm>
+            <a:off x="6987440" y="1825625"/>
+            <a:ext cx="3429200" cy="4351338"/>
+          </a:xfrm>
+        </p:spPr>
+      </p:pic>
+      <p:pic>
+        <p:nvPicPr>
+          <p:cNvPr id="9" name="Picture 8">
+            <a:extLst>
+              <a:ext uri="{FF2B5EF4-FFF2-40B4-BE49-F238E27FC236}">
+                <a16:creationId xmlns:a16="http://schemas.microsoft.com/office/drawing/2014/main" id="{D2FD6CFE-C7B3-7D18-7404-19B4E926B3F1}"/>
+              </a:ext>
+            </a:extLst>
+          </p:cNvPr>
+          <p:cNvPicPr>
+            <a:picLocks noChangeAspect="1"/>
+          </p:cNvPicPr>
+          <p:nvPr/>
+        </p:nvPicPr>
+        <p:blipFill>
+          <a:blip r:embed="rId3"/>
+          <a:stretch>
+            <a:fillRect/>
+          </a:stretch>
+        </p:blipFill>
+        <p:spPr>
+          <a:xfrm>
+            <a:off x="6987440" y="6081963"/>
+            <a:ext cx="3429200" cy="523671"/>
+          </a:xfrm>
+          <a:prstGeom prst="rect">
+            <a:avLst/>
+          </a:prstGeom>
+        </p:spPr>
+      </p:pic>
     </p:spTree>
     <p:extLst>
       <p:ext uri="{BB962C8B-B14F-4D97-AF65-F5344CB8AC3E}">
-        <p14:creationId xmlns:p14="http://schemas.microsoft.com/office/powerpoint/2010/main" val="1983003533"/>
+        <p14:creationId xmlns:p14="http://schemas.microsoft.com/office/powerpoint/2010/main" val="3255882086"/>
       </p:ext>
     </p:extLst>
   </p:cSld>
@@ -4028,13 +4195,7 @@
       </p:grpSpPr>
       <p:sp>
         <p:nvSpPr>
-          <p:cNvPr id="2" name="Title 1">
-            <a:extLst>
-              <a:ext uri="{FF2B5EF4-FFF2-40B4-BE49-F238E27FC236}">
-                <a16:creationId xmlns:a16="http://schemas.microsoft.com/office/drawing/2014/main" id="{095D3A39-E1CA-48E6-AFD5-6CA758F7328F}"/>
-              </a:ext>
-            </a:extLst>
-          </p:cNvPr>
+          <p:cNvPr id="2" name="Title 1"/>
           <p:cNvSpPr>
             <a:spLocks noGrp="1"/>
           </p:cNvSpPr>
@@ -4049,20 +4210,14 @@
           <a:p>
             <a:r>
               <a:rPr lang="en-US" dirty="0"/>
-              <a:t>Common risks in psychological science</a:t>
-            </a:r>
-          </a:p>
-        </p:txBody>
-      </p:sp>
-      <p:sp>
-        <p:nvSpPr>
-          <p:cNvPr id="3" name="Content Placeholder 2">
-            <a:extLst>
-              <a:ext uri="{FF2B5EF4-FFF2-40B4-BE49-F238E27FC236}">
-                <a16:creationId xmlns:a16="http://schemas.microsoft.com/office/drawing/2014/main" id="{6531FF39-2222-4CA0-9313-7B60BBE6C908}"/>
-              </a:ext>
-            </a:extLst>
-          </p:cNvPr>
+              <a:t>Chapter 8</a:t>
+            </a:r>
+          </a:p>
+        </p:txBody>
+      </p:sp>
+      <p:sp>
+        <p:nvSpPr>
+          <p:cNvPr id="3" name="Content Placeholder 2"/>
           <p:cNvSpPr>
             <a:spLocks noGrp="1"/>
           </p:cNvSpPr>
@@ -4072,73 +4227,112 @@
         </p:nvSpPr>
         <p:spPr/>
         <p:txBody>
-          <a:bodyPr/>
-          <a:lstStyle/>
-          <a:p>
-            <a:r>
-              <a:rPr lang="en-US" dirty="0"/>
-              <a:t>Deception</a:t>
+          <a:bodyPr>
+            <a:normAutofit/>
+          </a:bodyPr>
+          <a:lstStyle/>
+          <a:p>
+            <a:r>
+              <a:rPr lang="en-US" dirty="0"/>
+              <a:t>Research Ethics</a:t>
             </a:r>
           </a:p>
           <a:p>
             <a:pPr lvl="1"/>
             <a:r>
               <a:rPr lang="en-US" dirty="0"/>
-              <a:t>Lying to participants about the experiment</a:t>
-            </a:r>
-          </a:p>
-          <a:p>
-            <a:pPr lvl="2"/>
-            <a:r>
-              <a:rPr lang="en-US" dirty="0"/>
-              <a:t>Sneaky dependent variables</a:t>
-            </a:r>
-          </a:p>
-          <a:p>
-            <a:pPr lvl="1"/>
-            <a:r>
-              <a:rPr lang="en-US" dirty="0"/>
-              <a:t>Sometimes necessary for good design</a:t>
-            </a:r>
-          </a:p>
-          <a:p>
-            <a:r>
-              <a:rPr lang="en-US" dirty="0"/>
-              <a:t>Privacy</a:t>
-            </a:r>
-          </a:p>
-          <a:p>
-            <a:pPr lvl="1"/>
-            <a:r>
-              <a:rPr lang="en-US" dirty="0"/>
-              <a:t>Protecting identification of participants</a:t>
-            </a:r>
-          </a:p>
-          <a:p>
-            <a:pPr lvl="1"/>
-            <a:r>
-              <a:rPr lang="en-US" dirty="0"/>
-              <a:t>Which condition, whether you were in the study</a:t>
-            </a:r>
-          </a:p>
-          <a:p>
-            <a:r>
-              <a:rPr lang="en-US" dirty="0"/>
-              <a:t>Frustration/fatigue</a:t>
-            </a:r>
-          </a:p>
-          <a:p>
-            <a:r>
-              <a:rPr lang="en-US" dirty="0"/>
-              <a:t>Emotional manipulation</a:t>
-            </a:r>
+              <a:t>Fair and respectful treatment of participants in research</a:t>
+            </a:r>
+          </a:p>
+          <a:p>
+            <a:r>
+              <a:rPr lang="en-US" dirty="0"/>
+              <a:t>Basic Ethical Principles (Belmont Report)</a:t>
+            </a:r>
+          </a:p>
+          <a:p>
+            <a:pPr lvl="1">
+              <a:defRPr/>
+            </a:pPr>
+            <a:r>
+              <a:rPr lang="en-US" dirty="0"/>
+              <a:t>Respect for Persons</a:t>
+            </a:r>
+          </a:p>
+          <a:p>
+            <a:pPr lvl="2">
+              <a:buFont typeface="Arial" pitchFamily="34" charset="0"/>
+              <a:buChar char="–"/>
+              <a:defRPr/>
+            </a:pPr>
+            <a:r>
+              <a:rPr lang="en-US" dirty="0"/>
+              <a:t>Consent is voluntary</a:t>
+            </a:r>
+          </a:p>
+          <a:p>
+            <a:pPr lvl="2">
+              <a:buFont typeface="Arial" pitchFamily="34" charset="0"/>
+              <a:buChar char="–"/>
+              <a:defRPr/>
+            </a:pPr>
+            <a:r>
+              <a:rPr lang="en-US" dirty="0"/>
+              <a:t>Vulnerable populations are protected</a:t>
+            </a:r>
+          </a:p>
+          <a:p>
+            <a:pPr lvl="1">
+              <a:defRPr/>
+            </a:pPr>
+            <a:r>
+              <a:rPr lang="en-US" dirty="0"/>
+              <a:t>Beneficence</a:t>
+            </a:r>
+          </a:p>
+          <a:p>
+            <a:pPr lvl="2">
+              <a:buFont typeface="Arial" pitchFamily="34" charset="0"/>
+              <a:buChar char="–"/>
+              <a:defRPr/>
+            </a:pPr>
+            <a:r>
+              <a:rPr lang="en-US" dirty="0"/>
+              <a:t>Good outweighs the risk</a:t>
+            </a:r>
+          </a:p>
+          <a:p>
+            <a:pPr lvl="1">
+              <a:defRPr/>
+            </a:pPr>
+            <a:r>
+              <a:rPr lang="en-US" dirty="0"/>
+              <a:t>Justice</a:t>
+            </a:r>
+          </a:p>
+          <a:p>
+            <a:pPr lvl="2">
+              <a:buFont typeface="Arial" pitchFamily="34" charset="0"/>
+              <a:buChar char="–"/>
+              <a:defRPr/>
+            </a:pPr>
+            <a:r>
+              <a:rPr lang="en-US" dirty="0"/>
+              <a:t>Fairness in distribution</a:t>
+            </a:r>
+          </a:p>
+          <a:p>
+            <a:endParaRPr lang="en-US" dirty="0"/>
+          </a:p>
+          <a:p>
+            <a:endParaRPr lang="en-US" dirty="0"/>
           </a:p>
         </p:txBody>
       </p:sp>
     </p:spTree>
     <p:extLst>
       <p:ext uri="{BB962C8B-B14F-4D97-AF65-F5344CB8AC3E}">
-        <p14:creationId xmlns:p14="http://schemas.microsoft.com/office/powerpoint/2010/main" val="2590765830"/>
+        <p14:creationId xmlns:p14="http://schemas.microsoft.com/office/powerpoint/2010/main" val="4211413647"/>
       </p:ext>
     </p:extLst>
   </p:cSld>
@@ -4170,6 +4364,708 @@
           <p:cNvPr id="2" name="Title 1">
             <a:extLst>
               <a:ext uri="{FF2B5EF4-FFF2-40B4-BE49-F238E27FC236}">
+                <a16:creationId xmlns:a16="http://schemas.microsoft.com/office/drawing/2014/main" id="{9F405645-1BFF-23C5-87C4-BECF84E87721}"/>
+              </a:ext>
+            </a:extLst>
+          </p:cNvPr>
+          <p:cNvSpPr>
+            <a:spLocks noGrp="1"/>
+          </p:cNvSpPr>
+          <p:nvPr>
+            <p:ph type="title"/>
+          </p:nvPr>
+        </p:nvSpPr>
+        <p:spPr/>
+        <p:txBody>
+          <a:bodyPr/>
+          <a:lstStyle/>
+          <a:p>
+            <a:r>
+              <a:rPr lang="en-US" dirty="0"/>
+              <a:t>Famous ethical transgressions</a:t>
+            </a:r>
+          </a:p>
+        </p:txBody>
+      </p:sp>
+      <p:sp>
+        <p:nvSpPr>
+          <p:cNvPr id="3" name="Content Placeholder 2">
+            <a:extLst>
+              <a:ext uri="{FF2B5EF4-FFF2-40B4-BE49-F238E27FC236}">
+                <a16:creationId xmlns:a16="http://schemas.microsoft.com/office/drawing/2014/main" id="{607CA111-3F0C-133B-10F1-CC8A786C2438}"/>
+              </a:ext>
+            </a:extLst>
+          </p:cNvPr>
+          <p:cNvSpPr>
+            <a:spLocks noGrp="1"/>
+          </p:cNvSpPr>
+          <p:nvPr>
+            <p:ph idx="1"/>
+          </p:nvPr>
+        </p:nvSpPr>
+        <p:spPr/>
+        <p:txBody>
+          <a:bodyPr/>
+          <a:lstStyle/>
+          <a:p>
+            <a:r>
+              <a:rPr lang="en-US" dirty="0"/>
+              <a:t>Tuskegee Syphilis Study</a:t>
+            </a:r>
+          </a:p>
+          <a:p>
+            <a:r>
+              <a:rPr lang="en-US" dirty="0"/>
+              <a:t>Guatemala Syphilis</a:t>
+            </a:r>
+          </a:p>
+          <a:p>
+            <a:r>
+              <a:rPr lang="en-US" dirty="0" err="1"/>
+              <a:t>Willowbrook</a:t>
+            </a:r>
+            <a:r>
+              <a:rPr lang="en-US" dirty="0"/>
+              <a:t> State School Hepatitis studies</a:t>
+            </a:r>
+          </a:p>
+          <a:p>
+            <a:r>
+              <a:rPr lang="en-US" dirty="0"/>
+              <a:t>Milgram studies</a:t>
+            </a:r>
+          </a:p>
+          <a:p>
+            <a:r>
+              <a:rPr lang="en-US" dirty="0"/>
+              <a:t>Zimbardo prison studies</a:t>
+            </a:r>
+          </a:p>
+          <a:p>
+            <a:endParaRPr lang="en-US" dirty="0"/>
+          </a:p>
+        </p:txBody>
+      </p:sp>
+    </p:spTree>
+    <p:extLst>
+      <p:ext uri="{BB962C8B-B14F-4D97-AF65-F5344CB8AC3E}">
+        <p14:creationId xmlns:p14="http://schemas.microsoft.com/office/powerpoint/2010/main" val="2812420389"/>
+      </p:ext>
+    </p:extLst>
+  </p:cSld>
+  <p:clrMapOvr>
+    <a:masterClrMapping/>
+  </p:clrMapOvr>
+</p:sld>
+</file>
+
+<file path=ppt/slides/slide13.xml><?xml version="1.0" encoding="utf-8"?>
+<p:sld xmlns:a="http://schemas.openxmlformats.org/drawingml/2006/main" xmlns:r="http://schemas.openxmlformats.org/officeDocument/2006/relationships" xmlns:p="http://schemas.openxmlformats.org/presentationml/2006/main">
+  <p:cSld>
+    <p:spTree>
+      <p:nvGrpSpPr>
+        <p:cNvPr id="1" name=""/>
+        <p:cNvGrpSpPr/>
+        <p:nvPr/>
+      </p:nvGrpSpPr>
+      <p:grpSpPr>
+        <a:xfrm>
+          <a:off x="0" y="0"/>
+          <a:ext cx="0" cy="0"/>
+          <a:chOff x="0" y="0"/>
+          <a:chExt cx="0" cy="0"/>
+        </a:xfrm>
+      </p:grpSpPr>
+      <p:sp>
+        <p:nvSpPr>
+          <p:cNvPr id="2" name="Title 1">
+            <a:extLst>
+              <a:ext uri="{FF2B5EF4-FFF2-40B4-BE49-F238E27FC236}">
+                <a16:creationId xmlns:a16="http://schemas.microsoft.com/office/drawing/2014/main" id="{6C7039F4-887C-4983-B432-DD0BCF2ECA7E}"/>
+              </a:ext>
+            </a:extLst>
+          </p:cNvPr>
+          <p:cNvSpPr>
+            <a:spLocks noGrp="1"/>
+          </p:cNvSpPr>
+          <p:nvPr>
+            <p:ph type="title"/>
+          </p:nvPr>
+        </p:nvSpPr>
+        <p:spPr/>
+        <p:txBody>
+          <a:bodyPr/>
+          <a:lstStyle/>
+          <a:p>
+            <a:r>
+              <a:rPr lang="en-US" dirty="0"/>
+              <a:t>Historical Events in Research Ethics</a:t>
+            </a:r>
+          </a:p>
+        </p:txBody>
+      </p:sp>
+      <p:sp>
+        <p:nvSpPr>
+          <p:cNvPr id="3" name="Content Placeholder 2">
+            <a:extLst>
+              <a:ext uri="{FF2B5EF4-FFF2-40B4-BE49-F238E27FC236}">
+                <a16:creationId xmlns:a16="http://schemas.microsoft.com/office/drawing/2014/main" id="{DE91283D-2ECF-4323-ACD3-9A36C4C2A464}"/>
+              </a:ext>
+            </a:extLst>
+          </p:cNvPr>
+          <p:cNvSpPr>
+            <a:spLocks noGrp="1"/>
+          </p:cNvSpPr>
+          <p:nvPr>
+            <p:ph idx="1"/>
+          </p:nvPr>
+        </p:nvSpPr>
+        <p:spPr/>
+        <p:txBody>
+          <a:bodyPr>
+            <a:normAutofit lnSpcReduction="10000"/>
+          </a:bodyPr>
+          <a:lstStyle/>
+          <a:p>
+            <a:r>
+              <a:rPr lang="en-US" dirty="0"/>
+              <a:t>Nuremberg Code, 1947</a:t>
+            </a:r>
+          </a:p>
+          <a:p>
+            <a:pPr lvl="1"/>
+            <a:r>
+              <a:rPr lang="en-US" dirty="0"/>
+              <a:t>Response to Nazi researchers</a:t>
+            </a:r>
+          </a:p>
+          <a:p>
+            <a:r>
+              <a:rPr lang="en-US" dirty="0"/>
+              <a:t>Declaration of Helsinki, 1964</a:t>
+            </a:r>
+          </a:p>
+          <a:p>
+            <a:pPr lvl="1"/>
+            <a:r>
+              <a:rPr lang="en-US" dirty="0"/>
+              <a:t>Broader statement of principles</a:t>
+            </a:r>
+          </a:p>
+          <a:p>
+            <a:r>
+              <a:rPr lang="en-US" dirty="0"/>
+              <a:t>Belmont Report, 1979</a:t>
+            </a:r>
+          </a:p>
+          <a:p>
+            <a:pPr lvl="1"/>
+            <a:r>
+              <a:rPr lang="en-US" dirty="0"/>
+              <a:t>Respect for persons</a:t>
+            </a:r>
+          </a:p>
+          <a:p>
+            <a:pPr lvl="1"/>
+            <a:r>
+              <a:rPr lang="en-US" dirty="0"/>
+              <a:t>Beneficence</a:t>
+            </a:r>
+          </a:p>
+          <a:p>
+            <a:pPr lvl="1"/>
+            <a:r>
+              <a:rPr lang="en-US" dirty="0"/>
+              <a:t>Justice</a:t>
+            </a:r>
+          </a:p>
+          <a:p>
+            <a:r>
+              <a:rPr lang="en-US" dirty="0"/>
+              <a:t>APA Code of Ethics</a:t>
+            </a:r>
+          </a:p>
+          <a:p>
+            <a:pPr lvl="1"/>
+            <a:r>
+              <a:rPr lang="en-US" dirty="0"/>
+              <a:t>Includes integrity</a:t>
+            </a:r>
+          </a:p>
+        </p:txBody>
+      </p:sp>
+    </p:spTree>
+    <p:extLst>
+      <p:ext uri="{BB962C8B-B14F-4D97-AF65-F5344CB8AC3E}">
+        <p14:creationId xmlns:p14="http://schemas.microsoft.com/office/powerpoint/2010/main" val="3288209274"/>
+      </p:ext>
+    </p:extLst>
+  </p:cSld>
+  <p:clrMapOvr>
+    <a:masterClrMapping/>
+  </p:clrMapOvr>
+</p:sld>
+</file>
+
+<file path=ppt/slides/slide14.xml><?xml version="1.0" encoding="utf-8"?>
+<p:sld xmlns:a="http://schemas.openxmlformats.org/drawingml/2006/main" xmlns:r="http://schemas.openxmlformats.org/officeDocument/2006/relationships" xmlns:p="http://schemas.openxmlformats.org/presentationml/2006/main">
+  <p:cSld>
+    <p:spTree>
+      <p:nvGrpSpPr>
+        <p:cNvPr id="1" name=""/>
+        <p:cNvGrpSpPr/>
+        <p:nvPr/>
+      </p:nvGrpSpPr>
+      <p:grpSpPr>
+        <a:xfrm>
+          <a:off x="0" y="0"/>
+          <a:ext cx="0" cy="0"/>
+          <a:chOff x="0" y="0"/>
+          <a:chExt cx="0" cy="0"/>
+        </a:xfrm>
+      </p:grpSpPr>
+      <p:sp>
+        <p:nvSpPr>
+          <p:cNvPr id="2" name="Title 1">
+            <a:extLst>
+              <a:ext uri="{FF2B5EF4-FFF2-40B4-BE49-F238E27FC236}">
+                <a16:creationId xmlns:a16="http://schemas.microsoft.com/office/drawing/2014/main" id="{C69CA25E-0129-751D-CE09-49BE1BA80101}"/>
+              </a:ext>
+            </a:extLst>
+          </p:cNvPr>
+          <p:cNvSpPr>
+            <a:spLocks noGrp="1"/>
+          </p:cNvSpPr>
+          <p:nvPr>
+            <p:ph type="title"/>
+          </p:nvPr>
+        </p:nvSpPr>
+        <p:spPr/>
+        <p:txBody>
+          <a:bodyPr/>
+          <a:lstStyle/>
+          <a:p>
+            <a:r>
+              <a:rPr lang="en-US" dirty="0"/>
+              <a:t>IRB</a:t>
+            </a:r>
+          </a:p>
+        </p:txBody>
+      </p:sp>
+      <p:sp>
+        <p:nvSpPr>
+          <p:cNvPr id="3" name="Content Placeholder 2">
+            <a:extLst>
+              <a:ext uri="{FF2B5EF4-FFF2-40B4-BE49-F238E27FC236}">
+                <a16:creationId xmlns:a16="http://schemas.microsoft.com/office/drawing/2014/main" id="{49B3DB39-F32C-16FD-0122-2D9A0766B011}"/>
+              </a:ext>
+            </a:extLst>
+          </p:cNvPr>
+          <p:cNvSpPr>
+            <a:spLocks noGrp="1"/>
+          </p:cNvSpPr>
+          <p:nvPr>
+            <p:ph idx="1"/>
+          </p:nvPr>
+        </p:nvSpPr>
+        <p:spPr/>
+        <p:txBody>
+          <a:bodyPr>
+            <a:normAutofit/>
+          </a:bodyPr>
+          <a:lstStyle/>
+          <a:p>
+            <a:r>
+              <a:rPr lang="en-US" dirty="0"/>
+              <a:t>What is the main goal and purpose of the Institutional Review Board?</a:t>
+            </a:r>
+          </a:p>
+        </p:txBody>
+      </p:sp>
+    </p:spTree>
+    <p:extLst>
+      <p:ext uri="{BB962C8B-B14F-4D97-AF65-F5344CB8AC3E}">
+        <p14:creationId xmlns:p14="http://schemas.microsoft.com/office/powerpoint/2010/main" val="2712044758"/>
+      </p:ext>
+    </p:extLst>
+  </p:cSld>
+  <p:clrMapOvr>
+    <a:masterClrMapping/>
+  </p:clrMapOvr>
+</p:sld>
+</file>
+
+<file path=ppt/slides/slide15.xml><?xml version="1.0" encoding="utf-8"?>
+<p:sld xmlns:a="http://schemas.openxmlformats.org/drawingml/2006/main" xmlns:r="http://schemas.openxmlformats.org/officeDocument/2006/relationships" xmlns:p="http://schemas.openxmlformats.org/presentationml/2006/main">
+  <p:cSld>
+    <p:spTree>
+      <p:nvGrpSpPr>
+        <p:cNvPr id="1" name=""/>
+        <p:cNvGrpSpPr/>
+        <p:nvPr/>
+      </p:nvGrpSpPr>
+      <p:grpSpPr>
+        <a:xfrm>
+          <a:off x="0" y="0"/>
+          <a:ext cx="0" cy="0"/>
+          <a:chOff x="0" y="0"/>
+          <a:chExt cx="0" cy="0"/>
+        </a:xfrm>
+      </p:grpSpPr>
+      <p:sp>
+        <p:nvSpPr>
+          <p:cNvPr id="2" name="Title 1">
+            <a:extLst>
+              <a:ext uri="{FF2B5EF4-FFF2-40B4-BE49-F238E27FC236}">
+                <a16:creationId xmlns:a16="http://schemas.microsoft.com/office/drawing/2014/main" id="{FBB9C055-8258-D9A6-EFF9-A989F304FFDB}"/>
+              </a:ext>
+            </a:extLst>
+          </p:cNvPr>
+          <p:cNvSpPr>
+            <a:spLocks noGrp="1"/>
+          </p:cNvSpPr>
+          <p:nvPr>
+            <p:ph type="title"/>
+          </p:nvPr>
+        </p:nvSpPr>
+        <p:spPr/>
+        <p:txBody>
+          <a:bodyPr/>
+          <a:lstStyle/>
+          <a:p>
+            <a:r>
+              <a:rPr lang="en-US" dirty="0"/>
+              <a:t>Informed Consent</a:t>
+            </a:r>
+          </a:p>
+        </p:txBody>
+      </p:sp>
+      <p:sp>
+        <p:nvSpPr>
+          <p:cNvPr id="3" name="Content Placeholder 2">
+            <a:extLst>
+              <a:ext uri="{FF2B5EF4-FFF2-40B4-BE49-F238E27FC236}">
+                <a16:creationId xmlns:a16="http://schemas.microsoft.com/office/drawing/2014/main" id="{409C5025-2D7E-289A-4C93-0D00D1D91BCA}"/>
+              </a:ext>
+            </a:extLst>
+          </p:cNvPr>
+          <p:cNvSpPr>
+            <a:spLocks noGrp="1"/>
+          </p:cNvSpPr>
+          <p:nvPr>
+            <p:ph idx="1"/>
+          </p:nvPr>
+        </p:nvSpPr>
+        <p:spPr/>
+        <p:txBody>
+          <a:bodyPr/>
+          <a:lstStyle/>
+          <a:p>
+            <a:r>
+              <a:rPr lang="en-US" dirty="0"/>
+              <a:t>Before participating in a research experiment, all participants should generally read and sign an informed consent form.  What are 3 main goals of this process intended to maintain ethical standards for the scientific work?</a:t>
+            </a:r>
+          </a:p>
+          <a:p>
+            <a:endParaRPr lang="en-US" dirty="0"/>
+          </a:p>
+        </p:txBody>
+      </p:sp>
+    </p:spTree>
+    <p:extLst>
+      <p:ext uri="{BB962C8B-B14F-4D97-AF65-F5344CB8AC3E}">
+        <p14:creationId xmlns:p14="http://schemas.microsoft.com/office/powerpoint/2010/main" val="3892084121"/>
+      </p:ext>
+    </p:extLst>
+  </p:cSld>
+  <p:clrMapOvr>
+    <a:masterClrMapping/>
+  </p:clrMapOvr>
+</p:sld>
+</file>
+
+<file path=ppt/slides/slide16.xml><?xml version="1.0" encoding="utf-8"?>
+<p:sld xmlns:a="http://schemas.openxmlformats.org/drawingml/2006/main" xmlns:r="http://schemas.openxmlformats.org/officeDocument/2006/relationships" xmlns:p="http://schemas.openxmlformats.org/presentationml/2006/main">
+  <p:cSld>
+    <p:spTree>
+      <p:nvGrpSpPr>
+        <p:cNvPr id="1" name=""/>
+        <p:cNvGrpSpPr/>
+        <p:nvPr/>
+      </p:nvGrpSpPr>
+      <p:grpSpPr>
+        <a:xfrm>
+          <a:off x="0" y="0"/>
+          <a:ext cx="0" cy="0"/>
+          <a:chOff x="0" y="0"/>
+          <a:chExt cx="0" cy="0"/>
+        </a:xfrm>
+      </p:grpSpPr>
+      <p:sp>
+        <p:nvSpPr>
+          <p:cNvPr id="6146" name="Rectangle 2"/>
+          <p:cNvSpPr>
+            <a:spLocks noGrp="1" noChangeArrowheads="1"/>
+          </p:cNvSpPr>
+          <p:nvPr>
+            <p:ph type="title"/>
+          </p:nvPr>
+        </p:nvSpPr>
+        <p:spPr/>
+        <p:txBody>
+          <a:bodyPr/>
+          <a:lstStyle/>
+          <a:p>
+            <a:r>
+              <a:rPr lang="en-US" dirty="0"/>
+              <a:t>Ethical scientific practice</a:t>
+            </a:r>
+          </a:p>
+        </p:txBody>
+      </p:sp>
+      <p:sp>
+        <p:nvSpPr>
+          <p:cNvPr id="6147" name="Rectangle 3"/>
+          <p:cNvSpPr>
+            <a:spLocks noGrp="1" noChangeArrowheads="1"/>
+          </p:cNvSpPr>
+          <p:nvPr>
+            <p:ph type="body" idx="1"/>
+          </p:nvPr>
+        </p:nvSpPr>
+        <p:spPr/>
+        <p:txBody>
+          <a:bodyPr/>
+          <a:lstStyle/>
+          <a:p>
+            <a:r>
+              <a:rPr lang="en-US" dirty="0"/>
+              <a:t>Assure fair treatment of participants</a:t>
+            </a:r>
+          </a:p>
+          <a:p>
+            <a:r>
+              <a:rPr lang="en-US" dirty="0"/>
+              <a:t>Institutional Review Board (IRB)</a:t>
+            </a:r>
+          </a:p>
+          <a:p>
+            <a:pPr lvl="1"/>
+            <a:r>
+              <a:rPr lang="en-US" dirty="0"/>
+              <a:t>Reviews all formal research</a:t>
+            </a:r>
+          </a:p>
+          <a:p>
+            <a:pPr lvl="1"/>
+            <a:r>
+              <a:rPr lang="en-US" dirty="0"/>
+              <a:t>Risk/benefit analysis</a:t>
+            </a:r>
+          </a:p>
+          <a:p>
+            <a:r>
+              <a:rPr lang="en-US" dirty="0"/>
+              <a:t>Informed Consent</a:t>
+            </a:r>
+          </a:p>
+          <a:p>
+            <a:pPr lvl="1"/>
+            <a:r>
+              <a:rPr lang="en-US" dirty="0"/>
+              <a:t>Right to withdraw</a:t>
+            </a:r>
+          </a:p>
+          <a:p>
+            <a:pPr lvl="1"/>
+            <a:r>
+              <a:rPr lang="en-US" dirty="0"/>
+              <a:t>Full disclosure: risks, benefits, procedure</a:t>
+            </a:r>
+          </a:p>
+          <a:p>
+            <a:pPr lvl="1"/>
+            <a:r>
+              <a:rPr lang="en-US" dirty="0"/>
+              <a:t>Privacy</a:t>
+            </a:r>
+          </a:p>
+        </p:txBody>
+      </p:sp>
+    </p:spTree>
+    <p:extLst>
+      <p:ext uri="{BB962C8B-B14F-4D97-AF65-F5344CB8AC3E}">
+        <p14:creationId xmlns:p14="http://schemas.microsoft.com/office/powerpoint/2010/main" val="1983003533"/>
+      </p:ext>
+    </p:extLst>
+  </p:cSld>
+  <p:clrMapOvr>
+    <a:masterClrMapping/>
+  </p:clrMapOvr>
+</p:sld>
+</file>
+
+<file path=ppt/slides/slide17.xml><?xml version="1.0" encoding="utf-8"?>
+<p:sld xmlns:a="http://schemas.openxmlformats.org/drawingml/2006/main" xmlns:r="http://schemas.openxmlformats.org/officeDocument/2006/relationships" xmlns:p="http://schemas.openxmlformats.org/presentationml/2006/main">
+  <p:cSld>
+    <p:spTree>
+      <p:nvGrpSpPr>
+        <p:cNvPr id="1" name=""/>
+        <p:cNvGrpSpPr/>
+        <p:nvPr/>
+      </p:nvGrpSpPr>
+      <p:grpSpPr>
+        <a:xfrm>
+          <a:off x="0" y="0"/>
+          <a:ext cx="0" cy="0"/>
+          <a:chOff x="0" y="0"/>
+          <a:chExt cx="0" cy="0"/>
+        </a:xfrm>
+      </p:grpSpPr>
+      <p:sp>
+        <p:nvSpPr>
+          <p:cNvPr id="2" name="Title 1">
+            <a:extLst>
+              <a:ext uri="{FF2B5EF4-FFF2-40B4-BE49-F238E27FC236}">
+                <a16:creationId xmlns:a16="http://schemas.microsoft.com/office/drawing/2014/main" id="{095D3A39-E1CA-48E6-AFD5-6CA758F7328F}"/>
+              </a:ext>
+            </a:extLst>
+          </p:cNvPr>
+          <p:cNvSpPr>
+            <a:spLocks noGrp="1"/>
+          </p:cNvSpPr>
+          <p:nvPr>
+            <p:ph type="title"/>
+          </p:nvPr>
+        </p:nvSpPr>
+        <p:spPr/>
+        <p:txBody>
+          <a:bodyPr/>
+          <a:lstStyle/>
+          <a:p>
+            <a:r>
+              <a:rPr lang="en-US" dirty="0"/>
+              <a:t>Common risks in psychological science</a:t>
+            </a:r>
+          </a:p>
+        </p:txBody>
+      </p:sp>
+      <p:sp>
+        <p:nvSpPr>
+          <p:cNvPr id="3" name="Content Placeholder 2">
+            <a:extLst>
+              <a:ext uri="{FF2B5EF4-FFF2-40B4-BE49-F238E27FC236}">
+                <a16:creationId xmlns:a16="http://schemas.microsoft.com/office/drawing/2014/main" id="{6531FF39-2222-4CA0-9313-7B60BBE6C908}"/>
+              </a:ext>
+            </a:extLst>
+          </p:cNvPr>
+          <p:cNvSpPr>
+            <a:spLocks noGrp="1"/>
+          </p:cNvSpPr>
+          <p:nvPr>
+            <p:ph idx="1"/>
+          </p:nvPr>
+        </p:nvSpPr>
+        <p:spPr/>
+        <p:txBody>
+          <a:bodyPr/>
+          <a:lstStyle/>
+          <a:p>
+            <a:r>
+              <a:rPr lang="en-US" dirty="0"/>
+              <a:t>Deception</a:t>
+            </a:r>
+          </a:p>
+          <a:p>
+            <a:pPr lvl="1"/>
+            <a:r>
+              <a:rPr lang="en-US" dirty="0"/>
+              <a:t>Lying to participants about the experiment</a:t>
+            </a:r>
+          </a:p>
+          <a:p>
+            <a:pPr lvl="2"/>
+            <a:r>
+              <a:rPr lang="en-US" dirty="0"/>
+              <a:t>Sneaky dependent variables</a:t>
+            </a:r>
+          </a:p>
+          <a:p>
+            <a:pPr lvl="1"/>
+            <a:r>
+              <a:rPr lang="en-US" dirty="0"/>
+              <a:t>Sometimes necessary for good design</a:t>
+            </a:r>
+          </a:p>
+          <a:p>
+            <a:r>
+              <a:rPr lang="en-US" dirty="0"/>
+              <a:t>Privacy</a:t>
+            </a:r>
+          </a:p>
+          <a:p>
+            <a:pPr lvl="1"/>
+            <a:r>
+              <a:rPr lang="en-US" dirty="0"/>
+              <a:t>Protecting identification of participants</a:t>
+            </a:r>
+          </a:p>
+          <a:p>
+            <a:pPr lvl="1"/>
+            <a:r>
+              <a:rPr lang="en-US" dirty="0"/>
+              <a:t>Which condition, whether you were in the study</a:t>
+            </a:r>
+          </a:p>
+          <a:p>
+            <a:r>
+              <a:rPr lang="en-US" dirty="0"/>
+              <a:t>Frustration/fatigue</a:t>
+            </a:r>
+          </a:p>
+          <a:p>
+            <a:r>
+              <a:rPr lang="en-US" dirty="0"/>
+              <a:t>Emotional manipulation</a:t>
+            </a:r>
+          </a:p>
+        </p:txBody>
+      </p:sp>
+    </p:spTree>
+    <p:extLst>
+      <p:ext uri="{BB962C8B-B14F-4D97-AF65-F5344CB8AC3E}">
+        <p14:creationId xmlns:p14="http://schemas.microsoft.com/office/powerpoint/2010/main" val="2590765830"/>
+      </p:ext>
+    </p:extLst>
+  </p:cSld>
+  <p:clrMapOvr>
+    <a:masterClrMapping/>
+  </p:clrMapOvr>
+</p:sld>
+</file>
+
+<file path=ppt/slides/slide18.xml><?xml version="1.0" encoding="utf-8"?>
+<p:sld xmlns:a="http://schemas.openxmlformats.org/drawingml/2006/main" xmlns:r="http://schemas.openxmlformats.org/officeDocument/2006/relationships" xmlns:p="http://schemas.openxmlformats.org/presentationml/2006/main">
+  <p:cSld>
+    <p:spTree>
+      <p:nvGrpSpPr>
+        <p:cNvPr id="1" name=""/>
+        <p:cNvGrpSpPr/>
+        <p:nvPr/>
+      </p:nvGrpSpPr>
+      <p:grpSpPr>
+        <a:xfrm>
+          <a:off x="0" y="0"/>
+          <a:ext cx="0" cy="0"/>
+          <a:chOff x="0" y="0"/>
+          <a:chExt cx="0" cy="0"/>
+        </a:xfrm>
+      </p:grpSpPr>
+      <p:sp>
+        <p:nvSpPr>
+          <p:cNvPr id="2" name="Title 1">
+            <a:extLst>
+              <a:ext uri="{FF2B5EF4-FFF2-40B4-BE49-F238E27FC236}">
                 <a16:creationId xmlns:a16="http://schemas.microsoft.com/office/drawing/2014/main" id="{E113D58D-0D31-E2B9-DC5C-CCDCE1443FE3}"/>
               </a:ext>
             </a:extLst>
@@ -4234,7 +5130,7 @@
 </p:sld>
 </file>
 
-<file path=ppt/slides/slide13.xml><?xml version="1.0" encoding="utf-8"?>
+<file path=ppt/slides/slide19.xml><?xml version="1.0" encoding="utf-8"?>
 <p:sld xmlns:a="http://schemas.openxmlformats.org/drawingml/2006/main" xmlns:r="http://schemas.openxmlformats.org/officeDocument/2006/relationships" xmlns:p="http://schemas.openxmlformats.org/presentationml/2006/main">
   <p:cSld>
     <p:spTree>
@@ -4326,7 +5222,7 @@
 </p:sld>
 </file>
 
-<file path=ppt/slides/slide14.xml><?xml version="1.0" encoding="utf-8"?>
+<file path=ppt/slides/slide2.xml><?xml version="1.0" encoding="utf-8"?>
 <p:sld xmlns:a="http://schemas.openxmlformats.org/drawingml/2006/main" xmlns:r="http://schemas.openxmlformats.org/officeDocument/2006/relationships" xmlns:p="http://schemas.openxmlformats.org/presentationml/2006/main">
   <p:cSld>
     <p:spTree>
@@ -4348,7 +5244,7 @@
           <p:cNvPr id="2" name="Title 1">
             <a:extLst>
               <a:ext uri="{FF2B5EF4-FFF2-40B4-BE49-F238E27FC236}">
-                <a16:creationId xmlns:a16="http://schemas.microsoft.com/office/drawing/2014/main" id="{A9052240-4C3C-F589-C0DB-65FA68829992}"/>
+                <a16:creationId xmlns:a16="http://schemas.microsoft.com/office/drawing/2014/main" id="{A2AE4807-5DB0-4850-86C9-01ED3BE228F5}"/>
               </a:ext>
             </a:extLst>
           </p:cNvPr>
@@ -4364,97 +5260,43 @@
           <a:bodyPr/>
           <a:lstStyle/>
           <a:p>
-            <a:r>
-              <a:rPr lang="en-US" dirty="0"/>
-              <a:t>For Wed Oct 12</a:t>
-            </a:r>
-          </a:p>
-        </p:txBody>
-      </p:sp>
-      <p:sp>
-        <p:nvSpPr>
-          <p:cNvPr id="3" name="Content Placeholder 2">
-            <a:extLst>
-              <a:ext uri="{FF2B5EF4-FFF2-40B4-BE49-F238E27FC236}">
-                <a16:creationId xmlns:a16="http://schemas.microsoft.com/office/drawing/2014/main" id="{305446BE-32D1-2AE6-274A-69FE72AE0683}"/>
-              </a:ext>
-            </a:extLst>
-          </p:cNvPr>
-          <p:cNvSpPr>
-            <a:spLocks noGrp="1"/>
-          </p:cNvSpPr>
+            <a:endParaRPr lang="en-US"/>
+          </a:p>
+        </p:txBody>
+      </p:sp>
+      <p:pic>
+        <p:nvPicPr>
+          <p:cNvPr id="5" name="Content Placeholder 4">
+            <a:extLst>
+              <a:ext uri="{FF2B5EF4-FFF2-40B4-BE49-F238E27FC236}">
+                <a16:creationId xmlns:a16="http://schemas.microsoft.com/office/drawing/2014/main" id="{FC72EDAA-BD18-477C-8555-E041126D5068}"/>
+              </a:ext>
+            </a:extLst>
+          </p:cNvPr>
+          <p:cNvPicPr>
+            <a:picLocks noGrp="1" noChangeAspect="1"/>
+          </p:cNvPicPr>
           <p:nvPr>
             <p:ph idx="1"/>
           </p:nvPr>
-        </p:nvSpPr>
-        <p:spPr/>
-        <p:txBody>
-          <a:bodyPr/>
-          <a:lstStyle/>
-          <a:p>
-            <a:r>
-              <a:rPr lang="en-US" dirty="0"/>
-              <a:t>Exam 1</a:t>
-            </a:r>
-          </a:p>
-          <a:p>
-            <a:pPr lvl="1"/>
-            <a:r>
-              <a:rPr lang="en-US" dirty="0"/>
-              <a:t>Covers Chapters 1-8</a:t>
-            </a:r>
-          </a:p>
-          <a:p>
-            <a:pPr lvl="1"/>
-            <a:r>
-              <a:rPr lang="en-US" dirty="0"/>
-              <a:t>Prior exams posted to see format</a:t>
-            </a:r>
-          </a:p>
-          <a:p>
-            <a:pPr lvl="2"/>
-            <a:r>
-              <a:rPr lang="en-US" dirty="0"/>
-              <a:t>Note that specific topics covered were different in prior quarters</a:t>
-            </a:r>
-          </a:p>
-          <a:p>
-            <a:pPr lvl="2"/>
-            <a:r>
-              <a:rPr lang="en-US" dirty="0"/>
-              <a:t>Different tools/programs used for statistics</a:t>
-            </a:r>
-          </a:p>
-          <a:p>
-            <a:pPr lvl="2"/>
-            <a:r>
-              <a:rPr lang="en-US" dirty="0"/>
-              <a:t>You should be familiar with the output from R</a:t>
-            </a:r>
-          </a:p>
-          <a:p>
-            <a:pPr lvl="2"/>
-            <a:endParaRPr lang="en-US" dirty="0"/>
-          </a:p>
-          <a:p>
-            <a:r>
-              <a:rPr lang="en-US" dirty="0"/>
-              <a:t>Friday Oct 14 will be Chapter 9, Factorial design</a:t>
-            </a:r>
-          </a:p>
-          <a:p>
-            <a:pPr lvl="1"/>
-            <a:r>
-              <a:rPr lang="en-US" dirty="0"/>
-              <a:t>Then on to Experiment 2</a:t>
-            </a:r>
-          </a:p>
-        </p:txBody>
-      </p:sp>
+        </p:nvPicPr>
+        <p:blipFill>
+          <a:blip r:embed="rId2"/>
+          <a:stretch>
+            <a:fillRect/>
+          </a:stretch>
+        </p:blipFill>
+        <p:spPr>
+          <a:xfrm>
+            <a:off x="1503218" y="365125"/>
+            <a:ext cx="9457706" cy="5657506"/>
+          </a:xfrm>
+        </p:spPr>
+      </p:pic>
     </p:spTree>
     <p:extLst>
       <p:ext uri="{BB962C8B-B14F-4D97-AF65-F5344CB8AC3E}">
-        <p14:creationId xmlns:p14="http://schemas.microsoft.com/office/powerpoint/2010/main" val="2408486018"/>
+        <p14:creationId xmlns:p14="http://schemas.microsoft.com/office/powerpoint/2010/main" val="628076863"/>
       </p:ext>
     </p:extLst>
   </p:cSld>
@@ -4464,7 +5306,7 @@
 </p:sld>
 </file>
 
-<file path=ppt/slides/slide15.xml><?xml version="1.0" encoding="utf-8"?>
+<file path=ppt/slides/slide20.xml><?xml version="1.0" encoding="utf-8"?>
 <p:sld xmlns:a="http://schemas.openxmlformats.org/drawingml/2006/main" xmlns:r="http://schemas.openxmlformats.org/officeDocument/2006/relationships" xmlns:p="http://schemas.openxmlformats.org/presentationml/2006/main">
   <p:cSld>
     <p:spTree>
@@ -4486,6 +5328,144 @@
           <p:cNvPr id="2" name="Title 1">
             <a:extLst>
               <a:ext uri="{FF2B5EF4-FFF2-40B4-BE49-F238E27FC236}">
+                <a16:creationId xmlns:a16="http://schemas.microsoft.com/office/drawing/2014/main" id="{A9052240-4C3C-F589-C0DB-65FA68829992}"/>
+              </a:ext>
+            </a:extLst>
+          </p:cNvPr>
+          <p:cNvSpPr>
+            <a:spLocks noGrp="1"/>
+          </p:cNvSpPr>
+          <p:nvPr>
+            <p:ph type="title"/>
+          </p:nvPr>
+        </p:nvSpPr>
+        <p:spPr/>
+        <p:txBody>
+          <a:bodyPr/>
+          <a:lstStyle/>
+          <a:p>
+            <a:r>
+              <a:rPr lang="en-US" dirty="0"/>
+              <a:t>For Wed Oct 12</a:t>
+            </a:r>
+          </a:p>
+        </p:txBody>
+      </p:sp>
+      <p:sp>
+        <p:nvSpPr>
+          <p:cNvPr id="3" name="Content Placeholder 2">
+            <a:extLst>
+              <a:ext uri="{FF2B5EF4-FFF2-40B4-BE49-F238E27FC236}">
+                <a16:creationId xmlns:a16="http://schemas.microsoft.com/office/drawing/2014/main" id="{305446BE-32D1-2AE6-274A-69FE72AE0683}"/>
+              </a:ext>
+            </a:extLst>
+          </p:cNvPr>
+          <p:cNvSpPr>
+            <a:spLocks noGrp="1"/>
+          </p:cNvSpPr>
+          <p:nvPr>
+            <p:ph idx="1"/>
+          </p:nvPr>
+        </p:nvSpPr>
+        <p:spPr/>
+        <p:txBody>
+          <a:bodyPr/>
+          <a:lstStyle/>
+          <a:p>
+            <a:r>
+              <a:rPr lang="en-US" dirty="0"/>
+              <a:t>Exam 1</a:t>
+            </a:r>
+          </a:p>
+          <a:p>
+            <a:pPr lvl="1"/>
+            <a:r>
+              <a:rPr lang="en-US" dirty="0"/>
+              <a:t>Covers Chapters 1-8</a:t>
+            </a:r>
+          </a:p>
+          <a:p>
+            <a:pPr lvl="1"/>
+            <a:r>
+              <a:rPr lang="en-US" dirty="0"/>
+              <a:t>Prior exams posted to see format</a:t>
+            </a:r>
+          </a:p>
+          <a:p>
+            <a:pPr lvl="2"/>
+            <a:r>
+              <a:rPr lang="en-US" dirty="0"/>
+              <a:t>Note that specific topics covered were different in prior quarters</a:t>
+            </a:r>
+          </a:p>
+          <a:p>
+            <a:pPr lvl="2"/>
+            <a:r>
+              <a:rPr lang="en-US" dirty="0"/>
+              <a:t>Different tools/programs used for statistics</a:t>
+            </a:r>
+          </a:p>
+          <a:p>
+            <a:pPr lvl="2"/>
+            <a:r>
+              <a:rPr lang="en-US" dirty="0"/>
+              <a:t>You should be familiar with the output from R</a:t>
+            </a:r>
+          </a:p>
+          <a:p>
+            <a:pPr lvl="2"/>
+            <a:endParaRPr lang="en-US" dirty="0"/>
+          </a:p>
+          <a:p>
+            <a:r>
+              <a:rPr lang="en-US" dirty="0"/>
+              <a:t>Friday Oct 14 will be Chapter 9, Factorial design</a:t>
+            </a:r>
+          </a:p>
+          <a:p>
+            <a:pPr lvl="1"/>
+            <a:r>
+              <a:rPr lang="en-US" dirty="0"/>
+              <a:t>Then on to Experiment 2</a:t>
+            </a:r>
+          </a:p>
+        </p:txBody>
+      </p:sp>
+    </p:spTree>
+    <p:extLst>
+      <p:ext uri="{BB962C8B-B14F-4D97-AF65-F5344CB8AC3E}">
+        <p14:creationId xmlns:p14="http://schemas.microsoft.com/office/powerpoint/2010/main" val="2408486018"/>
+      </p:ext>
+    </p:extLst>
+  </p:cSld>
+  <p:clrMapOvr>
+    <a:masterClrMapping/>
+  </p:clrMapOvr>
+</p:sld>
+</file>
+
+<file path=ppt/slides/slide21.xml><?xml version="1.0" encoding="utf-8"?>
+<p:sld xmlns:a="http://schemas.openxmlformats.org/drawingml/2006/main" xmlns:r="http://schemas.openxmlformats.org/officeDocument/2006/relationships" xmlns:p="http://schemas.openxmlformats.org/presentationml/2006/main">
+  <p:cSld>
+    <p:spTree>
+      <p:nvGrpSpPr>
+        <p:cNvPr id="1" name=""/>
+        <p:cNvGrpSpPr/>
+        <p:nvPr/>
+      </p:nvGrpSpPr>
+      <p:grpSpPr>
+        <a:xfrm>
+          <a:off x="0" y="0"/>
+          <a:ext cx="0" cy="0"/>
+          <a:chOff x="0" y="0"/>
+          <a:chExt cx="0" cy="0"/>
+        </a:xfrm>
+      </p:grpSpPr>
+      <p:sp>
+        <p:nvSpPr>
+          <p:cNvPr id="2" name="Title 1">
+            <a:extLst>
+              <a:ext uri="{FF2B5EF4-FFF2-40B4-BE49-F238E27FC236}">
                 <a16:creationId xmlns:a16="http://schemas.microsoft.com/office/drawing/2014/main" id="{FB8CDBF7-3665-0301-20A7-60D41995C69E}"/>
               </a:ext>
             </a:extLst>
@@ -4564,7 +5544,905 @@
 </p:sld>
 </file>
 
-<file path=ppt/slides/slide2.xml><?xml version="1.0" encoding="utf-8"?>
+<file path=ppt/slides/slide3.xml><?xml version="1.0" encoding="utf-8"?>
+<p:sld xmlns:a="http://schemas.openxmlformats.org/drawingml/2006/main" xmlns:r="http://schemas.openxmlformats.org/officeDocument/2006/relationships" xmlns:p="http://schemas.openxmlformats.org/presentationml/2006/main">
+  <p:cSld>
+    <p:spTree>
+      <p:nvGrpSpPr>
+        <p:cNvPr id="1" name=""/>
+        <p:cNvGrpSpPr/>
+        <p:nvPr/>
+      </p:nvGrpSpPr>
+      <p:grpSpPr>
+        <a:xfrm>
+          <a:off x="0" y="0"/>
+          <a:ext cx="0" cy="0"/>
+          <a:chOff x="0" y="0"/>
+          <a:chExt cx="0" cy="0"/>
+        </a:xfrm>
+      </p:grpSpPr>
+      <p:sp>
+        <p:nvSpPr>
+          <p:cNvPr id="2" name="Title 1">
+            <a:extLst>
+              <a:ext uri="{FF2B5EF4-FFF2-40B4-BE49-F238E27FC236}">
+                <a16:creationId xmlns:a16="http://schemas.microsoft.com/office/drawing/2014/main" id="{56B5A7F1-D33C-B4FF-454B-40CABE1DB9F0}"/>
+              </a:ext>
+            </a:extLst>
+          </p:cNvPr>
+          <p:cNvSpPr>
+            <a:spLocks noGrp="1"/>
+          </p:cNvSpPr>
+          <p:nvPr>
+            <p:ph type="title"/>
+          </p:nvPr>
+        </p:nvSpPr>
+        <p:spPr/>
+        <p:txBody>
+          <a:bodyPr/>
+          <a:lstStyle/>
+          <a:p>
+            <a:r>
+              <a:rPr lang="en-US" dirty="0"/>
+              <a:t>Operational definitions</a:t>
+            </a:r>
+          </a:p>
+        </p:txBody>
+      </p:sp>
+      <p:sp>
+        <p:nvSpPr>
+          <p:cNvPr id="3" name="Content Placeholder 2">
+            <a:extLst>
+              <a:ext uri="{FF2B5EF4-FFF2-40B4-BE49-F238E27FC236}">
+                <a16:creationId xmlns:a16="http://schemas.microsoft.com/office/drawing/2014/main" id="{F8DE2A91-4D89-FC19-D00D-88EEF9FCEA8F}"/>
+              </a:ext>
+            </a:extLst>
+          </p:cNvPr>
+          <p:cNvSpPr>
+            <a:spLocks noGrp="1"/>
+          </p:cNvSpPr>
+          <p:nvPr>
+            <p:ph idx="1"/>
+          </p:nvPr>
+        </p:nvSpPr>
+        <p:spPr/>
+        <p:txBody>
+          <a:bodyPr/>
+          <a:lstStyle/>
+          <a:p>
+            <a:r>
+              <a:rPr lang="en-US" dirty="0"/>
+              <a:t>Creativity</a:t>
+            </a:r>
+          </a:p>
+          <a:p>
+            <a:pPr lvl="1"/>
+            <a:r>
+              <a:rPr lang="en-US" dirty="0"/>
+              <a:t>Remote Associates Test (RAT)</a:t>
+            </a:r>
+          </a:p>
+          <a:p>
+            <a:pPr lvl="1"/>
+            <a:r>
+              <a:rPr lang="en-US" dirty="0"/>
+              <a:t>What is the common word that links</a:t>
+            </a:r>
+          </a:p>
+          <a:p>
+            <a:pPr lvl="2"/>
+            <a:r>
+              <a:rPr lang="en-US" dirty="0"/>
+              <a:t>Sore, Shoulder, Sweat</a:t>
+            </a:r>
+          </a:p>
+          <a:p>
+            <a:pPr lvl="2"/>
+            <a:r>
+              <a:rPr lang="en-US" dirty="0"/>
+              <a:t>Opera, Hand, Dish</a:t>
+            </a:r>
+          </a:p>
+          <a:p>
+            <a:pPr lvl="2"/>
+            <a:r>
+              <a:rPr lang="en-US" dirty="0"/>
+              <a:t>Piece, Mind, Dating</a:t>
+            </a:r>
+          </a:p>
+          <a:p>
+            <a:pPr lvl="2"/>
+            <a:endParaRPr lang="en-US" dirty="0"/>
+          </a:p>
+          <a:p>
+            <a:r>
+              <a:rPr lang="en-US" dirty="0"/>
+              <a:t>Dishonesty</a:t>
+            </a:r>
+          </a:p>
+          <a:p>
+            <a:pPr lvl="1"/>
+            <a:r>
+              <a:rPr lang="en-US" dirty="0"/>
+              <a:t>Experimentally controllable (or measurable) cheating or lying</a:t>
+            </a:r>
+          </a:p>
+          <a:p>
+            <a:endParaRPr lang="en-US" dirty="0"/>
+          </a:p>
+        </p:txBody>
+      </p:sp>
+    </p:spTree>
+    <p:extLst>
+      <p:ext uri="{BB962C8B-B14F-4D97-AF65-F5344CB8AC3E}">
+        <p14:creationId xmlns:p14="http://schemas.microsoft.com/office/powerpoint/2010/main" val="348322382"/>
+      </p:ext>
+    </p:extLst>
+  </p:cSld>
+  <p:clrMapOvr>
+    <a:masterClrMapping/>
+  </p:clrMapOvr>
+</p:sld>
+</file>
+
+<file path=ppt/slides/slide4.xml><?xml version="1.0" encoding="utf-8"?>
+<p:sld xmlns:a="http://schemas.openxmlformats.org/drawingml/2006/main" xmlns:r="http://schemas.openxmlformats.org/officeDocument/2006/relationships" xmlns:p="http://schemas.openxmlformats.org/presentationml/2006/main">
+  <p:cSld>
+    <p:spTree>
+      <p:nvGrpSpPr>
+        <p:cNvPr id="1" name=""/>
+        <p:cNvGrpSpPr/>
+        <p:nvPr/>
+      </p:nvGrpSpPr>
+      <p:grpSpPr>
+        <a:xfrm>
+          <a:off x="0" y="0"/>
+          <a:ext cx="0" cy="0"/>
+          <a:chOff x="0" y="0"/>
+          <a:chExt cx="0" cy="0"/>
+        </a:xfrm>
+      </p:grpSpPr>
+      <p:sp>
+        <p:nvSpPr>
+          <p:cNvPr id="2" name="Title 1">
+            <a:extLst>
+              <a:ext uri="{FF2B5EF4-FFF2-40B4-BE49-F238E27FC236}">
+                <a16:creationId xmlns:a16="http://schemas.microsoft.com/office/drawing/2014/main" id="{74861B7D-4B00-29C8-7C04-C52C66680FBF}"/>
+              </a:ext>
+            </a:extLst>
+          </p:cNvPr>
+          <p:cNvSpPr>
+            <a:spLocks noGrp="1"/>
+          </p:cNvSpPr>
+          <p:nvPr>
+            <p:ph type="title"/>
+          </p:nvPr>
+        </p:nvSpPr>
+        <p:spPr/>
+        <p:txBody>
+          <a:bodyPr/>
+          <a:lstStyle/>
+          <a:p>
+            <a:r>
+              <a:rPr lang="en-US" dirty="0"/>
+              <a:t>Experiment 1</a:t>
+            </a:r>
+          </a:p>
+        </p:txBody>
+      </p:sp>
+      <p:sp>
+        <p:nvSpPr>
+          <p:cNvPr id="4" name="Content Placeholder 3">
+            <a:extLst>
+              <a:ext uri="{FF2B5EF4-FFF2-40B4-BE49-F238E27FC236}">
+                <a16:creationId xmlns:a16="http://schemas.microsoft.com/office/drawing/2014/main" id="{4421224F-E152-3602-A847-4E0F8D9802E5}"/>
+              </a:ext>
+            </a:extLst>
+          </p:cNvPr>
+          <p:cNvSpPr>
+            <a:spLocks noGrp="1"/>
+          </p:cNvSpPr>
+          <p:nvPr>
+            <p:ph sz="half" idx="1"/>
+          </p:nvPr>
+        </p:nvSpPr>
+        <p:spPr/>
+        <p:txBody>
+          <a:bodyPr/>
+          <a:lstStyle/>
+          <a:p>
+            <a:r>
+              <a:rPr lang="en-US" dirty="0"/>
+              <a:t>Procedure</a:t>
+            </a:r>
+          </a:p>
+          <a:p>
+            <a:pPr lvl="1"/>
+            <a:r>
+              <a:rPr lang="en-US" dirty="0"/>
+              <a:t>Dunker candle problem</a:t>
+            </a:r>
+          </a:p>
+          <a:p>
+            <a:pPr lvl="1"/>
+            <a:r>
+              <a:rPr lang="en-US" dirty="0"/>
+              <a:t>Filler/cheatable task</a:t>
+            </a:r>
+          </a:p>
+          <a:p>
+            <a:pPr lvl="2"/>
+            <a:r>
+              <a:rPr lang="en-US" dirty="0"/>
+              <a:t>10 matrices</a:t>
+            </a:r>
+          </a:p>
+          <a:p>
+            <a:pPr lvl="2"/>
+            <a:r>
+              <a:rPr lang="en-US" dirty="0"/>
+              <a:t>Self-reported performance, paid</a:t>
+            </a:r>
+          </a:p>
+          <a:p>
+            <a:pPr lvl="1"/>
+            <a:r>
+              <a:rPr lang="en-US" dirty="0"/>
+              <a:t>RAT performance</a:t>
+            </a:r>
+          </a:p>
+          <a:p>
+            <a:r>
+              <a:rPr lang="en-US" dirty="0"/>
+              <a:t>Results</a:t>
+            </a:r>
+          </a:p>
+          <a:p>
+            <a:pPr lvl="1"/>
+            <a:r>
+              <a:rPr lang="en-US" dirty="0"/>
+              <a:t>Cheaters performed better on the RAT test</a:t>
+            </a:r>
+          </a:p>
+        </p:txBody>
+      </p:sp>
+      <p:pic>
+        <p:nvPicPr>
+          <p:cNvPr id="7" name="Content Placeholder 6">
+            <a:extLst>
+              <a:ext uri="{FF2B5EF4-FFF2-40B4-BE49-F238E27FC236}">
+                <a16:creationId xmlns:a16="http://schemas.microsoft.com/office/drawing/2014/main" id="{C1761D21-8644-36C2-8A67-39AEB691D12B}"/>
+              </a:ext>
+            </a:extLst>
+          </p:cNvPr>
+          <p:cNvPicPr>
+            <a:picLocks noGrp="1" noChangeAspect="1"/>
+          </p:cNvPicPr>
+          <p:nvPr>
+            <p:ph sz="half" idx="2"/>
+          </p:nvPr>
+        </p:nvPicPr>
+        <p:blipFill>
+          <a:blip r:embed="rId2"/>
+          <a:stretch>
+            <a:fillRect/>
+          </a:stretch>
+        </p:blipFill>
+        <p:spPr>
+          <a:xfrm>
+            <a:off x="6601574" y="1825625"/>
+            <a:ext cx="4322851" cy="4351338"/>
+          </a:xfrm>
+        </p:spPr>
+      </p:pic>
+    </p:spTree>
+    <p:extLst>
+      <p:ext uri="{BB962C8B-B14F-4D97-AF65-F5344CB8AC3E}">
+        <p14:creationId xmlns:p14="http://schemas.microsoft.com/office/powerpoint/2010/main" val="4139939674"/>
+      </p:ext>
+    </p:extLst>
+  </p:cSld>
+  <p:clrMapOvr>
+    <a:masterClrMapping/>
+  </p:clrMapOvr>
+</p:sld>
+</file>
+
+<file path=ppt/slides/slide5.xml><?xml version="1.0" encoding="utf-8"?>
+<p:sld xmlns:a="http://schemas.openxmlformats.org/drawingml/2006/main" xmlns:r="http://schemas.openxmlformats.org/officeDocument/2006/relationships" xmlns:p="http://schemas.openxmlformats.org/presentationml/2006/main">
+  <p:cSld>
+    <p:spTree>
+      <p:nvGrpSpPr>
+        <p:cNvPr id="1" name=""/>
+        <p:cNvGrpSpPr/>
+        <p:nvPr/>
+      </p:nvGrpSpPr>
+      <p:grpSpPr>
+        <a:xfrm>
+          <a:off x="0" y="0"/>
+          <a:ext cx="0" cy="0"/>
+          <a:chOff x="0" y="0"/>
+          <a:chExt cx="0" cy="0"/>
+        </a:xfrm>
+      </p:grpSpPr>
+      <p:sp>
+        <p:nvSpPr>
+          <p:cNvPr id="2" name="Title 1">
+            <a:extLst>
+              <a:ext uri="{FF2B5EF4-FFF2-40B4-BE49-F238E27FC236}">
+                <a16:creationId xmlns:a16="http://schemas.microsoft.com/office/drawing/2014/main" id="{D911C49F-BE14-B8B2-F6EC-D26934A738F4}"/>
+              </a:ext>
+            </a:extLst>
+          </p:cNvPr>
+          <p:cNvSpPr>
+            <a:spLocks noGrp="1"/>
+          </p:cNvSpPr>
+          <p:nvPr>
+            <p:ph type="title"/>
+          </p:nvPr>
+        </p:nvSpPr>
+        <p:spPr/>
+        <p:txBody>
+          <a:bodyPr/>
+          <a:lstStyle/>
+          <a:p>
+            <a:r>
+              <a:rPr lang="en-US" dirty="0"/>
+              <a:t>Experiment 2</a:t>
+            </a:r>
+          </a:p>
+        </p:txBody>
+      </p:sp>
+      <p:pic>
+        <p:nvPicPr>
+          <p:cNvPr id="6" name="Content Placeholder 5">
+            <a:extLst>
+              <a:ext uri="{FF2B5EF4-FFF2-40B4-BE49-F238E27FC236}">
+                <a16:creationId xmlns:a16="http://schemas.microsoft.com/office/drawing/2014/main" id="{B0E94F48-F6C2-113E-1FE9-7CFBEAEFCF7D}"/>
+              </a:ext>
+            </a:extLst>
+          </p:cNvPr>
+          <p:cNvPicPr>
+            <a:picLocks noGrp="1" noChangeAspect="1"/>
+          </p:cNvPicPr>
+          <p:nvPr>
+            <p:ph sz="half" idx="1"/>
+          </p:nvPr>
+        </p:nvPicPr>
+        <p:blipFill>
+          <a:blip r:embed="rId2"/>
+          <a:stretch>
+            <a:fillRect/>
+          </a:stretch>
+        </p:blipFill>
+        <p:spPr>
+          <a:xfrm>
+            <a:off x="838200" y="1825625"/>
+            <a:ext cx="5181600" cy="2314832"/>
+          </a:xfrm>
+        </p:spPr>
+      </p:pic>
+      <p:sp>
+        <p:nvSpPr>
+          <p:cNvPr id="4" name="Content Placeholder 3">
+            <a:extLst>
+              <a:ext uri="{FF2B5EF4-FFF2-40B4-BE49-F238E27FC236}">
+                <a16:creationId xmlns:a16="http://schemas.microsoft.com/office/drawing/2014/main" id="{DD7F9912-7A00-D0F9-0758-E904418754A6}"/>
+              </a:ext>
+            </a:extLst>
+          </p:cNvPr>
+          <p:cNvSpPr>
+            <a:spLocks noGrp="1"/>
+          </p:cNvSpPr>
+          <p:nvPr>
+            <p:ph sz="half" idx="2"/>
+          </p:nvPr>
+        </p:nvSpPr>
+        <p:spPr>
+          <a:xfrm>
+            <a:off x="6172200" y="1825625"/>
+            <a:ext cx="5181600" cy="4351338"/>
+          </a:xfrm>
+        </p:spPr>
+        <p:txBody>
+          <a:bodyPr/>
+          <a:lstStyle/>
+          <a:p>
+            <a:r>
+              <a:rPr lang="en-US" dirty="0"/>
+              <a:t>How do you experimentally control cheating to be able to randomly assign participants to the “cheating” and control conditions?</a:t>
+            </a:r>
+          </a:p>
+          <a:p>
+            <a:pPr lvl="1"/>
+            <a:r>
+              <a:rPr lang="en-US" dirty="0"/>
+              <a:t>Operational definition of this IV</a:t>
+            </a:r>
+          </a:p>
+        </p:txBody>
+      </p:sp>
+    </p:spTree>
+    <p:extLst>
+      <p:ext uri="{BB962C8B-B14F-4D97-AF65-F5344CB8AC3E}">
+        <p14:creationId xmlns:p14="http://schemas.microsoft.com/office/powerpoint/2010/main" val="3925862589"/>
+      </p:ext>
+    </p:extLst>
+  </p:cSld>
+  <p:clrMapOvr>
+    <a:masterClrMapping/>
+  </p:clrMapOvr>
+</p:sld>
+</file>
+
+<file path=ppt/slides/slide6.xml><?xml version="1.0" encoding="utf-8"?>
+<p:sld xmlns:a="http://schemas.openxmlformats.org/drawingml/2006/main" xmlns:r="http://schemas.openxmlformats.org/officeDocument/2006/relationships" xmlns:p="http://schemas.openxmlformats.org/presentationml/2006/main">
+  <p:cSld>
+    <p:spTree>
+      <p:nvGrpSpPr>
+        <p:cNvPr id="1" name=""/>
+        <p:cNvGrpSpPr/>
+        <p:nvPr/>
+      </p:nvGrpSpPr>
+      <p:grpSpPr>
+        <a:xfrm>
+          <a:off x="0" y="0"/>
+          <a:ext cx="0" cy="0"/>
+          <a:chOff x="0" y="0"/>
+          <a:chExt cx="0" cy="0"/>
+        </a:xfrm>
+      </p:grpSpPr>
+      <p:sp>
+        <p:nvSpPr>
+          <p:cNvPr id="2" name="Title 1">
+            <a:extLst>
+              <a:ext uri="{FF2B5EF4-FFF2-40B4-BE49-F238E27FC236}">
+                <a16:creationId xmlns:a16="http://schemas.microsoft.com/office/drawing/2014/main" id="{5D60529F-1CDC-46FE-9D99-90BDB442FE3C}"/>
+              </a:ext>
+            </a:extLst>
+          </p:cNvPr>
+          <p:cNvSpPr>
+            <a:spLocks noGrp="1"/>
+          </p:cNvSpPr>
+          <p:nvPr>
+            <p:ph type="title"/>
+          </p:nvPr>
+        </p:nvSpPr>
+        <p:spPr/>
+        <p:txBody>
+          <a:bodyPr/>
+          <a:lstStyle/>
+          <a:p>
+            <a:endParaRPr lang="en-US"/>
+          </a:p>
+        </p:txBody>
+      </p:sp>
+      <p:pic>
+        <p:nvPicPr>
+          <p:cNvPr id="4" name="Content Placeholder 3">
+            <a:extLst>
+              <a:ext uri="{FF2B5EF4-FFF2-40B4-BE49-F238E27FC236}">
+                <a16:creationId xmlns:a16="http://schemas.microsoft.com/office/drawing/2014/main" id="{F16602EC-731D-4668-B615-218C30D63CA2}"/>
+              </a:ext>
+            </a:extLst>
+          </p:cNvPr>
+          <p:cNvPicPr>
+            <a:picLocks noGrp="1" noChangeAspect="1"/>
+          </p:cNvPicPr>
+          <p:nvPr>
+            <p:ph idx="1"/>
+          </p:nvPr>
+        </p:nvPicPr>
+        <p:blipFill>
+          <a:blip r:embed="rId2"/>
+          <a:stretch>
+            <a:fillRect/>
+          </a:stretch>
+        </p:blipFill>
+        <p:spPr>
+          <a:xfrm>
+            <a:off x="3821108" y="442120"/>
+            <a:ext cx="4549784" cy="5973763"/>
+          </a:xfrm>
+          <a:prstGeom prst="rect">
+            <a:avLst/>
+          </a:prstGeom>
+        </p:spPr>
+      </p:pic>
+      <p:cxnSp>
+        <p:nvCxnSpPr>
+          <p:cNvPr id="6" name="Straight Arrow Connector 5">
+            <a:extLst>
+              <a:ext uri="{FF2B5EF4-FFF2-40B4-BE49-F238E27FC236}">
+                <a16:creationId xmlns:a16="http://schemas.microsoft.com/office/drawing/2014/main" id="{4763B7A4-D46F-450F-AD96-AEEA02CA8FE4}"/>
+              </a:ext>
+            </a:extLst>
+          </p:cNvPr>
+          <p:cNvCxnSpPr/>
+          <p:nvPr/>
+        </p:nvCxnSpPr>
+        <p:spPr>
+          <a:xfrm flipH="1">
+            <a:off x="8370892" y="3230960"/>
+            <a:ext cx="1676400" cy="685800"/>
+          </a:xfrm>
+          <a:prstGeom prst="straightConnector1">
+            <a:avLst/>
+          </a:prstGeom>
+          <a:ln w="76200">
+            <a:tailEnd type="triangle"/>
+          </a:ln>
+        </p:spPr>
+        <p:style>
+          <a:lnRef idx="1">
+            <a:schemeClr val="accent1"/>
+          </a:lnRef>
+          <a:fillRef idx="0">
+            <a:schemeClr val="accent1"/>
+          </a:fillRef>
+          <a:effectRef idx="0">
+            <a:schemeClr val="accent1"/>
+          </a:effectRef>
+          <a:fontRef idx="minor">
+            <a:schemeClr val="tx1"/>
+          </a:fontRef>
+        </p:style>
+      </p:cxnSp>
+      <p:cxnSp>
+        <p:nvCxnSpPr>
+          <p:cNvPr id="7" name="Straight Arrow Connector 6">
+            <a:extLst>
+              <a:ext uri="{FF2B5EF4-FFF2-40B4-BE49-F238E27FC236}">
+                <a16:creationId xmlns:a16="http://schemas.microsoft.com/office/drawing/2014/main" id="{381D0917-F725-40D6-A7CA-5363AF959010}"/>
+              </a:ext>
+            </a:extLst>
+          </p:cNvPr>
+          <p:cNvCxnSpPr>
+            <a:cxnSpLocks/>
+          </p:cNvCxnSpPr>
+          <p:nvPr/>
+        </p:nvCxnSpPr>
+        <p:spPr>
+          <a:xfrm>
+            <a:off x="2144708" y="5638800"/>
+            <a:ext cx="1600200" cy="381000"/>
+          </a:xfrm>
+          <a:prstGeom prst="straightConnector1">
+            <a:avLst/>
+          </a:prstGeom>
+          <a:ln w="76200">
+            <a:tailEnd type="triangle"/>
+          </a:ln>
+        </p:spPr>
+        <p:style>
+          <a:lnRef idx="1">
+            <a:schemeClr val="accent1"/>
+          </a:lnRef>
+          <a:fillRef idx="0">
+            <a:schemeClr val="accent1"/>
+          </a:fillRef>
+          <a:effectRef idx="0">
+            <a:schemeClr val="accent1"/>
+          </a:effectRef>
+          <a:fontRef idx="minor">
+            <a:schemeClr val="tx1"/>
+          </a:fontRef>
+        </p:style>
+      </p:cxnSp>
+      <p:sp>
+        <p:nvSpPr>
+          <p:cNvPr id="9" name="TextBox 8">
+            <a:extLst>
+              <a:ext uri="{FF2B5EF4-FFF2-40B4-BE49-F238E27FC236}">
+                <a16:creationId xmlns:a16="http://schemas.microsoft.com/office/drawing/2014/main" id="{F6B7335F-2AFD-4DE2-8356-DDF14B5E2F6C}"/>
+              </a:ext>
+            </a:extLst>
+          </p:cNvPr>
+          <p:cNvSpPr txBox="1"/>
+          <p:nvPr/>
+        </p:nvSpPr>
+        <p:spPr>
+          <a:xfrm>
+            <a:off x="9753600" y="2895600"/>
+            <a:ext cx="373820" cy="369332"/>
+          </a:xfrm>
+          <a:prstGeom prst="rect">
+            <a:avLst/>
+          </a:prstGeom>
+          <a:noFill/>
+        </p:spPr>
+        <p:txBody>
+          <a:bodyPr wrap="none" rtlCol="0">
+            <a:spAutoFit/>
+          </a:bodyPr>
+          <a:lstStyle/>
+          <a:p>
+            <a:r>
+              <a:rPr lang="en-US" dirty="0"/>
+              <a:t>IV</a:t>
+            </a:r>
+          </a:p>
+        </p:txBody>
+      </p:sp>
+      <p:sp>
+        <p:nvSpPr>
+          <p:cNvPr id="11" name="TextBox 10">
+            <a:extLst>
+              <a:ext uri="{FF2B5EF4-FFF2-40B4-BE49-F238E27FC236}">
+                <a16:creationId xmlns:a16="http://schemas.microsoft.com/office/drawing/2014/main" id="{1965172A-94EE-4EB6-BAF8-B313E85EF552}"/>
+              </a:ext>
+            </a:extLst>
+          </p:cNvPr>
+          <p:cNvSpPr txBox="1"/>
+          <p:nvPr/>
+        </p:nvSpPr>
+        <p:spPr>
+          <a:xfrm>
+            <a:off x="1943372" y="5251075"/>
+            <a:ext cx="456087" cy="369332"/>
+          </a:xfrm>
+          <a:prstGeom prst="rect">
+            <a:avLst/>
+          </a:prstGeom>
+          <a:noFill/>
+        </p:spPr>
+        <p:txBody>
+          <a:bodyPr wrap="none" rtlCol="0">
+            <a:spAutoFit/>
+          </a:bodyPr>
+          <a:lstStyle/>
+          <a:p>
+            <a:r>
+              <a:rPr lang="en-US" dirty="0"/>
+              <a:t>DV</a:t>
+            </a:r>
+          </a:p>
+        </p:txBody>
+      </p:sp>
+    </p:spTree>
+    <p:extLst>
+      <p:ext uri="{BB962C8B-B14F-4D97-AF65-F5344CB8AC3E}">
+        <p14:creationId xmlns:p14="http://schemas.microsoft.com/office/powerpoint/2010/main" val="1480564895"/>
+      </p:ext>
+    </p:extLst>
+  </p:cSld>
+  <p:clrMapOvr>
+    <a:masterClrMapping/>
+  </p:clrMapOvr>
+</p:sld>
+</file>
+
+<file path=ppt/slides/slide7.xml><?xml version="1.0" encoding="utf-8"?>
+<p:sld xmlns:a="http://schemas.openxmlformats.org/drawingml/2006/main" xmlns:r="http://schemas.openxmlformats.org/officeDocument/2006/relationships" xmlns:p="http://schemas.openxmlformats.org/presentationml/2006/main">
+  <p:cSld>
+    <p:spTree>
+      <p:nvGrpSpPr>
+        <p:cNvPr id="1" name=""/>
+        <p:cNvGrpSpPr/>
+        <p:nvPr/>
+      </p:nvGrpSpPr>
+      <p:grpSpPr>
+        <a:xfrm>
+          <a:off x="0" y="0"/>
+          <a:ext cx="0" cy="0"/>
+          <a:chOff x="0" y="0"/>
+          <a:chExt cx="0" cy="0"/>
+        </a:xfrm>
+      </p:grpSpPr>
+      <p:pic>
+        <p:nvPicPr>
+          <p:cNvPr id="4" name="Picture 3">
+            <a:extLst>
+              <a:ext uri="{FF2B5EF4-FFF2-40B4-BE49-F238E27FC236}">
+                <a16:creationId xmlns:a16="http://schemas.microsoft.com/office/drawing/2014/main" id="{2C382589-DF89-4F7A-B70A-36FE5FE7BD50}"/>
+              </a:ext>
+            </a:extLst>
+          </p:cNvPr>
+          <p:cNvPicPr>
+            <a:picLocks noChangeAspect="1"/>
+          </p:cNvPicPr>
+          <p:nvPr/>
+        </p:nvPicPr>
+        <p:blipFill>
+          <a:blip r:embed="rId3"/>
+          <a:stretch>
+            <a:fillRect/>
+          </a:stretch>
+        </p:blipFill>
+        <p:spPr>
+          <a:xfrm>
+            <a:off x="2819401" y="1214890"/>
+            <a:ext cx="5407809" cy="4164013"/>
+          </a:xfrm>
+          <a:prstGeom prst="rect">
+            <a:avLst/>
+          </a:prstGeom>
+        </p:spPr>
+      </p:pic>
+      <p:sp>
+        <p:nvSpPr>
+          <p:cNvPr id="5" name="TextBox 4">
+            <a:extLst>
+              <a:ext uri="{FF2B5EF4-FFF2-40B4-BE49-F238E27FC236}">
+                <a16:creationId xmlns:a16="http://schemas.microsoft.com/office/drawing/2014/main" id="{D30EE7D4-2C64-4856-BD01-B70BCB2B6F68}"/>
+              </a:ext>
+            </a:extLst>
+          </p:cNvPr>
+          <p:cNvSpPr txBox="1"/>
+          <p:nvPr/>
+        </p:nvSpPr>
+        <p:spPr>
+          <a:xfrm>
+            <a:off x="8534400" y="3136079"/>
+            <a:ext cx="2133600" cy="1754326"/>
+          </a:xfrm>
+          <a:prstGeom prst="rect">
+            <a:avLst/>
+          </a:prstGeom>
+          <a:noFill/>
+        </p:spPr>
+        <p:txBody>
+          <a:bodyPr wrap="square" rtlCol="0">
+            <a:spAutoFit/>
+          </a:bodyPr>
+          <a:lstStyle/>
+          <a:p>
+            <a:r>
+              <a:rPr lang="en-US" dirty="0"/>
+              <a:t>Effect size:</a:t>
+            </a:r>
+          </a:p>
+          <a:p>
+            <a:pPr lvl="1"/>
+            <a:r>
+              <a:rPr lang="en-US" dirty="0"/>
+              <a:t>6.20 vs 4.65 problems solved</a:t>
+            </a:r>
+          </a:p>
+          <a:p>
+            <a:pPr lvl="1"/>
+            <a:endParaRPr lang="en-US" dirty="0"/>
+          </a:p>
+          <a:p>
+            <a:pPr lvl="1"/>
+            <a:r>
+              <a:rPr lang="en-US" dirty="0"/>
+              <a:t>= 1.55 more</a:t>
+            </a:r>
+          </a:p>
+        </p:txBody>
+      </p:sp>
+      <p:cxnSp>
+        <p:nvCxnSpPr>
+          <p:cNvPr id="6" name="Straight Arrow Connector 5">
+            <a:extLst>
+              <a:ext uri="{FF2B5EF4-FFF2-40B4-BE49-F238E27FC236}">
+                <a16:creationId xmlns:a16="http://schemas.microsoft.com/office/drawing/2014/main" id="{51E4D346-7A24-4997-A3DF-360C389130C5}"/>
+              </a:ext>
+            </a:extLst>
+          </p:cNvPr>
+          <p:cNvCxnSpPr>
+            <a:cxnSpLocks/>
+          </p:cNvCxnSpPr>
+          <p:nvPr/>
+        </p:nvCxnSpPr>
+        <p:spPr>
+          <a:xfrm flipV="1">
+            <a:off x="2819400" y="3447395"/>
+            <a:ext cx="1280488" cy="2011051"/>
+          </a:xfrm>
+          <a:prstGeom prst="straightConnector1">
+            <a:avLst/>
+          </a:prstGeom>
+          <a:ln w="76200">
+            <a:tailEnd type="triangle"/>
+          </a:ln>
+        </p:spPr>
+        <p:style>
+          <a:lnRef idx="1">
+            <a:schemeClr val="accent1"/>
+          </a:lnRef>
+          <a:fillRef idx="0">
+            <a:schemeClr val="accent1"/>
+          </a:fillRef>
+          <a:effectRef idx="0">
+            <a:schemeClr val="accent1"/>
+          </a:effectRef>
+          <a:fontRef idx="minor">
+            <a:schemeClr val="tx1"/>
+          </a:fontRef>
+        </p:style>
+      </p:cxnSp>
+      <p:cxnSp>
+        <p:nvCxnSpPr>
+          <p:cNvPr id="8" name="Straight Arrow Connector 7">
+            <a:extLst>
+              <a:ext uri="{FF2B5EF4-FFF2-40B4-BE49-F238E27FC236}">
+                <a16:creationId xmlns:a16="http://schemas.microsoft.com/office/drawing/2014/main" id="{7DDBF528-7FFA-4C75-B305-2CE01A708A3E}"/>
+              </a:ext>
+            </a:extLst>
+          </p:cNvPr>
+          <p:cNvCxnSpPr>
+            <a:cxnSpLocks/>
+          </p:cNvCxnSpPr>
+          <p:nvPr/>
+        </p:nvCxnSpPr>
+        <p:spPr>
+          <a:xfrm flipH="1">
+            <a:off x="8092114" y="2618679"/>
+            <a:ext cx="1844329" cy="238481"/>
+          </a:xfrm>
+          <a:prstGeom prst="straightConnector1">
+            <a:avLst/>
+          </a:prstGeom>
+          <a:ln w="76200">
+            <a:tailEnd type="triangle"/>
+          </a:ln>
+        </p:spPr>
+        <p:style>
+          <a:lnRef idx="1">
+            <a:schemeClr val="accent1"/>
+          </a:lnRef>
+          <a:fillRef idx="0">
+            <a:schemeClr val="accent1"/>
+          </a:fillRef>
+          <a:effectRef idx="0">
+            <a:schemeClr val="accent1"/>
+          </a:effectRef>
+          <a:fontRef idx="minor">
+            <a:schemeClr val="tx1"/>
+          </a:fontRef>
+        </p:style>
+      </p:cxnSp>
+      <p:sp>
+        <p:nvSpPr>
+          <p:cNvPr id="11" name="TextBox 10">
+            <a:extLst>
+              <a:ext uri="{FF2B5EF4-FFF2-40B4-BE49-F238E27FC236}">
+                <a16:creationId xmlns:a16="http://schemas.microsoft.com/office/drawing/2014/main" id="{C911C3B9-A38C-4346-80C6-0BBB354FB62E}"/>
+              </a:ext>
+            </a:extLst>
+          </p:cNvPr>
+          <p:cNvSpPr txBox="1"/>
+          <p:nvPr/>
+        </p:nvSpPr>
+        <p:spPr>
+          <a:xfrm>
+            <a:off x="1905000" y="5458445"/>
+            <a:ext cx="2931444" cy="369332"/>
+          </a:xfrm>
+          <a:prstGeom prst="rect">
+            <a:avLst/>
+          </a:prstGeom>
+          <a:noFill/>
+        </p:spPr>
+        <p:txBody>
+          <a:bodyPr wrap="none" rtlCol="0">
+            <a:spAutoFit/>
+          </a:bodyPr>
+          <a:lstStyle/>
+          <a:p>
+            <a:r>
+              <a:rPr lang="en-US" dirty="0"/>
+              <a:t>2 independent samples t-test</a:t>
+            </a:r>
+          </a:p>
+        </p:txBody>
+      </p:sp>
+    </p:spTree>
+    <p:extLst>
+      <p:ext uri="{BB962C8B-B14F-4D97-AF65-F5344CB8AC3E}">
+        <p14:creationId xmlns:p14="http://schemas.microsoft.com/office/powerpoint/2010/main" val="4198122806"/>
+      </p:ext>
+    </p:extLst>
+  </p:cSld>
+  <p:clrMapOvr>
+    <a:masterClrMapping/>
+  </p:clrMapOvr>
+</p:sld>
+</file>
+
+<file path=ppt/slides/slide8.xml><?xml version="1.0" encoding="utf-8"?>
 <p:sld xmlns:a="http://schemas.openxmlformats.org/drawingml/2006/main" xmlns:r="http://schemas.openxmlformats.org/officeDocument/2006/relationships" xmlns:p="http://schemas.openxmlformats.org/presentationml/2006/main">
   <p:cSld>
     <p:spTree>
@@ -4733,7 +6611,7 @@
 </p:sld>
 </file>
 
-<file path=ppt/slides/slide3.xml><?xml version="1.0" encoding="utf-8"?>
+<file path=ppt/slides/slide9.xml><?xml version="1.0" encoding="utf-8"?>
 <p:sld xmlns:a="http://schemas.openxmlformats.org/drawingml/2006/main" xmlns:r="http://schemas.openxmlformats.org/officeDocument/2006/relationships" xmlns:p="http://schemas.openxmlformats.org/presentationml/2006/main">
   <p:cSld>
     <p:spTree>
@@ -4864,774 +6742,6 @@
     <p:extLst>
       <p:ext uri="{BB962C8B-B14F-4D97-AF65-F5344CB8AC3E}">
         <p14:creationId xmlns:p14="http://schemas.microsoft.com/office/powerpoint/2010/main" val="2857920107"/>
-      </p:ext>
-    </p:extLst>
-  </p:cSld>
-  <p:clrMapOvr>
-    <a:masterClrMapping/>
-  </p:clrMapOvr>
-</p:sld>
-</file>
-
-<file path=ppt/slides/slide4.xml><?xml version="1.0" encoding="utf-8"?>
-<p:sld xmlns:a="http://schemas.openxmlformats.org/drawingml/2006/main" xmlns:r="http://schemas.openxmlformats.org/officeDocument/2006/relationships" xmlns:p="http://schemas.openxmlformats.org/presentationml/2006/main">
-  <p:cSld>
-    <p:spTree>
-      <p:nvGrpSpPr>
-        <p:cNvPr id="1" name=""/>
-        <p:cNvGrpSpPr/>
-        <p:nvPr/>
-      </p:nvGrpSpPr>
-      <p:grpSpPr>
-        <a:xfrm>
-          <a:off x="0" y="0"/>
-          <a:ext cx="0" cy="0"/>
-          <a:chOff x="0" y="0"/>
-          <a:chExt cx="0" cy="0"/>
-        </a:xfrm>
-      </p:grpSpPr>
-      <p:sp>
-        <p:nvSpPr>
-          <p:cNvPr id="4" name="Title 3">
-            <a:extLst>
-              <a:ext uri="{FF2B5EF4-FFF2-40B4-BE49-F238E27FC236}">
-                <a16:creationId xmlns:a16="http://schemas.microsoft.com/office/drawing/2014/main" id="{4689CD80-ECD2-32A4-4A57-433E21A363D5}"/>
-              </a:ext>
-            </a:extLst>
-          </p:cNvPr>
-          <p:cNvSpPr>
-            <a:spLocks noGrp="1"/>
-          </p:cNvSpPr>
-          <p:nvPr>
-            <p:ph type="title"/>
-          </p:nvPr>
-        </p:nvSpPr>
-        <p:spPr/>
-        <p:txBody>
-          <a:bodyPr/>
-          <a:lstStyle/>
-          <a:p>
-            <a:r>
-              <a:rPr lang="en-US" dirty="0"/>
-              <a:t>Conclusions</a:t>
-            </a:r>
-          </a:p>
-        </p:txBody>
-      </p:sp>
-      <p:sp>
-        <p:nvSpPr>
-          <p:cNvPr id="3" name="Content Placeholder 2">
-            <a:extLst>
-              <a:ext uri="{FF2B5EF4-FFF2-40B4-BE49-F238E27FC236}">
-                <a16:creationId xmlns:a16="http://schemas.microsoft.com/office/drawing/2014/main" id="{314B1870-E958-9E21-FD6F-B94995B62D61}"/>
-              </a:ext>
-            </a:extLst>
-          </p:cNvPr>
-          <p:cNvSpPr>
-            <a:spLocks noGrp="1"/>
-          </p:cNvSpPr>
-          <p:nvPr>
-            <p:ph sz="half" idx="1"/>
-          </p:nvPr>
-        </p:nvSpPr>
-        <p:spPr/>
-        <p:txBody>
-          <a:bodyPr/>
-          <a:lstStyle/>
-          <a:p>
-            <a:r>
-              <a:rPr lang="en-US" sz="1800" dirty="0">
-                <a:solidFill>
-                  <a:srgbClr val="2D3B45"/>
-                </a:solidFill>
-                <a:effectLst/>
-                <a:latin typeface="Lato" panose="020F0502020204030203" pitchFamily="34" charset="0"/>
-                <a:ea typeface="Times New Roman" panose="02020603050405020304" pitchFamily="18" charset="0"/>
-              </a:rPr>
-              <a:t>Experiments 4 and 5 use yet additional novel manipulations of honesty to measure creativity effects.  From the General Discussion, how do the authors explain the overall set of their findings with respect to the theoretical relationship between dishonesty and creativity via a mechanism?  Give an example of a speculative point made that goes beyond the statement of results.</a:t>
-            </a:r>
-            <a:endParaRPr lang="en-US" sz="1800" dirty="0">
-              <a:effectLst/>
-              <a:latin typeface="Times New Roman" panose="02020603050405020304" pitchFamily="18" charset="0"/>
-              <a:ea typeface="Times New Roman" panose="02020603050405020304" pitchFamily="18" charset="0"/>
-            </a:endParaRPr>
-          </a:p>
-          <a:p>
-            <a:endParaRPr lang="en-US" dirty="0"/>
-          </a:p>
-        </p:txBody>
-      </p:sp>
-      <p:pic>
-        <p:nvPicPr>
-          <p:cNvPr id="7" name="Content Placeholder 6">
-            <a:extLst>
-              <a:ext uri="{FF2B5EF4-FFF2-40B4-BE49-F238E27FC236}">
-                <a16:creationId xmlns:a16="http://schemas.microsoft.com/office/drawing/2014/main" id="{641F0D9F-F7F3-F194-D590-27A1DDA4C585}"/>
-              </a:ext>
-            </a:extLst>
-          </p:cNvPr>
-          <p:cNvPicPr>
-            <a:picLocks noGrp="1" noChangeAspect="1"/>
-          </p:cNvPicPr>
-          <p:nvPr>
-            <p:ph sz="half" idx="2"/>
-          </p:nvPr>
-        </p:nvPicPr>
-        <p:blipFill>
-          <a:blip r:embed="rId2"/>
-          <a:stretch>
-            <a:fillRect/>
-          </a:stretch>
-        </p:blipFill>
-        <p:spPr>
-          <a:xfrm>
-            <a:off x="6987440" y="1825625"/>
-            <a:ext cx="3429200" cy="4351338"/>
-          </a:xfrm>
-        </p:spPr>
-      </p:pic>
-      <p:pic>
-        <p:nvPicPr>
-          <p:cNvPr id="9" name="Picture 8">
-            <a:extLst>
-              <a:ext uri="{FF2B5EF4-FFF2-40B4-BE49-F238E27FC236}">
-                <a16:creationId xmlns:a16="http://schemas.microsoft.com/office/drawing/2014/main" id="{D2FD6CFE-C7B3-7D18-7404-19B4E926B3F1}"/>
-              </a:ext>
-            </a:extLst>
-          </p:cNvPr>
-          <p:cNvPicPr>
-            <a:picLocks noChangeAspect="1"/>
-          </p:cNvPicPr>
-          <p:nvPr/>
-        </p:nvPicPr>
-        <p:blipFill>
-          <a:blip r:embed="rId3"/>
-          <a:stretch>
-            <a:fillRect/>
-          </a:stretch>
-        </p:blipFill>
-        <p:spPr>
-          <a:xfrm>
-            <a:off x="6987440" y="6081963"/>
-            <a:ext cx="3429200" cy="523671"/>
-          </a:xfrm>
-          <a:prstGeom prst="rect">
-            <a:avLst/>
-          </a:prstGeom>
-        </p:spPr>
-      </p:pic>
-    </p:spTree>
-    <p:extLst>
-      <p:ext uri="{BB962C8B-B14F-4D97-AF65-F5344CB8AC3E}">
-        <p14:creationId xmlns:p14="http://schemas.microsoft.com/office/powerpoint/2010/main" val="3255882086"/>
-      </p:ext>
-    </p:extLst>
-  </p:cSld>
-  <p:clrMapOvr>
-    <a:masterClrMapping/>
-  </p:clrMapOvr>
-</p:sld>
-</file>
-
-<file path=ppt/slides/slide5.xml><?xml version="1.0" encoding="utf-8"?>
-<p:sld xmlns:a="http://schemas.openxmlformats.org/drawingml/2006/main" xmlns:r="http://schemas.openxmlformats.org/officeDocument/2006/relationships" xmlns:p="http://schemas.openxmlformats.org/presentationml/2006/main">
-  <p:cSld>
-    <p:spTree>
-      <p:nvGrpSpPr>
-        <p:cNvPr id="1" name=""/>
-        <p:cNvGrpSpPr/>
-        <p:nvPr/>
-      </p:nvGrpSpPr>
-      <p:grpSpPr>
-        <a:xfrm>
-          <a:off x="0" y="0"/>
-          <a:ext cx="0" cy="0"/>
-          <a:chOff x="0" y="0"/>
-          <a:chExt cx="0" cy="0"/>
-        </a:xfrm>
-      </p:grpSpPr>
-      <p:sp>
-        <p:nvSpPr>
-          <p:cNvPr id="2" name="Title 1"/>
-          <p:cNvSpPr>
-            <a:spLocks noGrp="1"/>
-          </p:cNvSpPr>
-          <p:nvPr>
-            <p:ph type="title"/>
-          </p:nvPr>
-        </p:nvSpPr>
-        <p:spPr/>
-        <p:txBody>
-          <a:bodyPr/>
-          <a:lstStyle/>
-          <a:p>
-            <a:r>
-              <a:rPr lang="en-US" dirty="0"/>
-              <a:t>Chapter 8</a:t>
-            </a:r>
-          </a:p>
-        </p:txBody>
-      </p:sp>
-      <p:sp>
-        <p:nvSpPr>
-          <p:cNvPr id="3" name="Content Placeholder 2"/>
-          <p:cNvSpPr>
-            <a:spLocks noGrp="1"/>
-          </p:cNvSpPr>
-          <p:nvPr>
-            <p:ph idx="1"/>
-          </p:nvPr>
-        </p:nvSpPr>
-        <p:spPr/>
-        <p:txBody>
-          <a:bodyPr>
-            <a:normAutofit/>
-          </a:bodyPr>
-          <a:lstStyle/>
-          <a:p>
-            <a:r>
-              <a:rPr lang="en-US" dirty="0"/>
-              <a:t>Research Ethics</a:t>
-            </a:r>
-          </a:p>
-          <a:p>
-            <a:pPr lvl="1"/>
-            <a:r>
-              <a:rPr lang="en-US" dirty="0"/>
-              <a:t>Fair and respectful treatment of participants in research</a:t>
-            </a:r>
-          </a:p>
-          <a:p>
-            <a:r>
-              <a:rPr lang="en-US" dirty="0"/>
-              <a:t>Basic Ethical Principles (Belmont Report)</a:t>
-            </a:r>
-          </a:p>
-          <a:p>
-            <a:pPr lvl="1">
-              <a:defRPr/>
-            </a:pPr>
-            <a:r>
-              <a:rPr lang="en-US" dirty="0"/>
-              <a:t>Respect for Persons</a:t>
-            </a:r>
-          </a:p>
-          <a:p>
-            <a:pPr lvl="2">
-              <a:buFont typeface="Arial" pitchFamily="34" charset="0"/>
-              <a:buChar char="–"/>
-              <a:defRPr/>
-            </a:pPr>
-            <a:r>
-              <a:rPr lang="en-US" dirty="0"/>
-              <a:t>Consent is voluntary</a:t>
-            </a:r>
-          </a:p>
-          <a:p>
-            <a:pPr lvl="2">
-              <a:buFont typeface="Arial" pitchFamily="34" charset="0"/>
-              <a:buChar char="–"/>
-              <a:defRPr/>
-            </a:pPr>
-            <a:r>
-              <a:rPr lang="en-US" dirty="0"/>
-              <a:t>Vulnerable populations are protected</a:t>
-            </a:r>
-          </a:p>
-          <a:p>
-            <a:pPr lvl="1">
-              <a:defRPr/>
-            </a:pPr>
-            <a:r>
-              <a:rPr lang="en-US" dirty="0"/>
-              <a:t>Beneficence</a:t>
-            </a:r>
-          </a:p>
-          <a:p>
-            <a:pPr lvl="2">
-              <a:buFont typeface="Arial" pitchFamily="34" charset="0"/>
-              <a:buChar char="–"/>
-              <a:defRPr/>
-            </a:pPr>
-            <a:r>
-              <a:rPr lang="en-US" dirty="0"/>
-              <a:t>Good outweighs the risk</a:t>
-            </a:r>
-          </a:p>
-          <a:p>
-            <a:pPr lvl="1">
-              <a:defRPr/>
-            </a:pPr>
-            <a:r>
-              <a:rPr lang="en-US" dirty="0"/>
-              <a:t>Justice</a:t>
-            </a:r>
-          </a:p>
-          <a:p>
-            <a:pPr lvl="2">
-              <a:buFont typeface="Arial" pitchFamily="34" charset="0"/>
-              <a:buChar char="–"/>
-              <a:defRPr/>
-            </a:pPr>
-            <a:r>
-              <a:rPr lang="en-US" dirty="0"/>
-              <a:t>Fairness in distribution</a:t>
-            </a:r>
-          </a:p>
-          <a:p>
-            <a:endParaRPr lang="en-US" dirty="0"/>
-          </a:p>
-          <a:p>
-            <a:endParaRPr lang="en-US" dirty="0"/>
-          </a:p>
-        </p:txBody>
-      </p:sp>
-    </p:spTree>
-    <p:extLst>
-      <p:ext uri="{BB962C8B-B14F-4D97-AF65-F5344CB8AC3E}">
-        <p14:creationId xmlns:p14="http://schemas.microsoft.com/office/powerpoint/2010/main" val="4211413647"/>
-      </p:ext>
-    </p:extLst>
-  </p:cSld>
-  <p:clrMapOvr>
-    <a:masterClrMapping/>
-  </p:clrMapOvr>
-</p:sld>
-</file>
-
-<file path=ppt/slides/slide6.xml><?xml version="1.0" encoding="utf-8"?>
-<p:sld xmlns:a="http://schemas.openxmlformats.org/drawingml/2006/main" xmlns:r="http://schemas.openxmlformats.org/officeDocument/2006/relationships" xmlns:p="http://schemas.openxmlformats.org/presentationml/2006/main">
-  <p:cSld>
-    <p:spTree>
-      <p:nvGrpSpPr>
-        <p:cNvPr id="1" name=""/>
-        <p:cNvGrpSpPr/>
-        <p:nvPr/>
-      </p:nvGrpSpPr>
-      <p:grpSpPr>
-        <a:xfrm>
-          <a:off x="0" y="0"/>
-          <a:ext cx="0" cy="0"/>
-          <a:chOff x="0" y="0"/>
-          <a:chExt cx="0" cy="0"/>
-        </a:xfrm>
-      </p:grpSpPr>
-      <p:sp>
-        <p:nvSpPr>
-          <p:cNvPr id="2" name="Title 1">
-            <a:extLst>
-              <a:ext uri="{FF2B5EF4-FFF2-40B4-BE49-F238E27FC236}">
-                <a16:creationId xmlns:a16="http://schemas.microsoft.com/office/drawing/2014/main" id="{9F405645-1BFF-23C5-87C4-BECF84E87721}"/>
-              </a:ext>
-            </a:extLst>
-          </p:cNvPr>
-          <p:cNvSpPr>
-            <a:spLocks noGrp="1"/>
-          </p:cNvSpPr>
-          <p:nvPr>
-            <p:ph type="title"/>
-          </p:nvPr>
-        </p:nvSpPr>
-        <p:spPr/>
-        <p:txBody>
-          <a:bodyPr/>
-          <a:lstStyle/>
-          <a:p>
-            <a:r>
-              <a:rPr lang="en-US" dirty="0"/>
-              <a:t>Famous ethical transgressions</a:t>
-            </a:r>
-          </a:p>
-        </p:txBody>
-      </p:sp>
-      <p:sp>
-        <p:nvSpPr>
-          <p:cNvPr id="3" name="Content Placeholder 2">
-            <a:extLst>
-              <a:ext uri="{FF2B5EF4-FFF2-40B4-BE49-F238E27FC236}">
-                <a16:creationId xmlns:a16="http://schemas.microsoft.com/office/drawing/2014/main" id="{607CA111-3F0C-133B-10F1-CC8A786C2438}"/>
-              </a:ext>
-            </a:extLst>
-          </p:cNvPr>
-          <p:cNvSpPr>
-            <a:spLocks noGrp="1"/>
-          </p:cNvSpPr>
-          <p:nvPr>
-            <p:ph idx="1"/>
-          </p:nvPr>
-        </p:nvSpPr>
-        <p:spPr/>
-        <p:txBody>
-          <a:bodyPr/>
-          <a:lstStyle/>
-          <a:p>
-            <a:r>
-              <a:rPr lang="en-US" dirty="0"/>
-              <a:t>Tuskegee Syphilis Study</a:t>
-            </a:r>
-          </a:p>
-          <a:p>
-            <a:r>
-              <a:rPr lang="en-US" dirty="0"/>
-              <a:t>Guatemala Syphilis</a:t>
-            </a:r>
-          </a:p>
-          <a:p>
-            <a:r>
-              <a:rPr lang="en-US" dirty="0" err="1"/>
-              <a:t>Willowbrook</a:t>
-            </a:r>
-            <a:r>
-              <a:rPr lang="en-US" dirty="0"/>
-              <a:t> State School Hepatitis studies</a:t>
-            </a:r>
-          </a:p>
-          <a:p>
-            <a:r>
-              <a:rPr lang="en-US" dirty="0"/>
-              <a:t>Milgram studies</a:t>
-            </a:r>
-          </a:p>
-          <a:p>
-            <a:r>
-              <a:rPr lang="en-US" dirty="0"/>
-              <a:t>Zimbardo prison studies</a:t>
-            </a:r>
-          </a:p>
-          <a:p>
-            <a:endParaRPr lang="en-US" dirty="0"/>
-          </a:p>
-        </p:txBody>
-      </p:sp>
-    </p:spTree>
-    <p:extLst>
-      <p:ext uri="{BB962C8B-B14F-4D97-AF65-F5344CB8AC3E}">
-        <p14:creationId xmlns:p14="http://schemas.microsoft.com/office/powerpoint/2010/main" val="2812420389"/>
-      </p:ext>
-    </p:extLst>
-  </p:cSld>
-  <p:clrMapOvr>
-    <a:masterClrMapping/>
-  </p:clrMapOvr>
-</p:sld>
-</file>
-
-<file path=ppt/slides/slide7.xml><?xml version="1.0" encoding="utf-8"?>
-<p:sld xmlns:a="http://schemas.openxmlformats.org/drawingml/2006/main" xmlns:r="http://schemas.openxmlformats.org/officeDocument/2006/relationships" xmlns:p="http://schemas.openxmlformats.org/presentationml/2006/main">
-  <p:cSld>
-    <p:spTree>
-      <p:nvGrpSpPr>
-        <p:cNvPr id="1" name=""/>
-        <p:cNvGrpSpPr/>
-        <p:nvPr/>
-      </p:nvGrpSpPr>
-      <p:grpSpPr>
-        <a:xfrm>
-          <a:off x="0" y="0"/>
-          <a:ext cx="0" cy="0"/>
-          <a:chOff x="0" y="0"/>
-          <a:chExt cx="0" cy="0"/>
-        </a:xfrm>
-      </p:grpSpPr>
-      <p:sp>
-        <p:nvSpPr>
-          <p:cNvPr id="2" name="Title 1">
-            <a:extLst>
-              <a:ext uri="{FF2B5EF4-FFF2-40B4-BE49-F238E27FC236}">
-                <a16:creationId xmlns:a16="http://schemas.microsoft.com/office/drawing/2014/main" id="{6C7039F4-887C-4983-B432-DD0BCF2ECA7E}"/>
-              </a:ext>
-            </a:extLst>
-          </p:cNvPr>
-          <p:cNvSpPr>
-            <a:spLocks noGrp="1"/>
-          </p:cNvSpPr>
-          <p:nvPr>
-            <p:ph type="title"/>
-          </p:nvPr>
-        </p:nvSpPr>
-        <p:spPr/>
-        <p:txBody>
-          <a:bodyPr/>
-          <a:lstStyle/>
-          <a:p>
-            <a:r>
-              <a:rPr lang="en-US" dirty="0"/>
-              <a:t>Historical Events in Research Ethics</a:t>
-            </a:r>
-          </a:p>
-        </p:txBody>
-      </p:sp>
-      <p:sp>
-        <p:nvSpPr>
-          <p:cNvPr id="3" name="Content Placeholder 2">
-            <a:extLst>
-              <a:ext uri="{FF2B5EF4-FFF2-40B4-BE49-F238E27FC236}">
-                <a16:creationId xmlns:a16="http://schemas.microsoft.com/office/drawing/2014/main" id="{DE91283D-2ECF-4323-ACD3-9A36C4C2A464}"/>
-              </a:ext>
-            </a:extLst>
-          </p:cNvPr>
-          <p:cNvSpPr>
-            <a:spLocks noGrp="1"/>
-          </p:cNvSpPr>
-          <p:nvPr>
-            <p:ph idx="1"/>
-          </p:nvPr>
-        </p:nvSpPr>
-        <p:spPr/>
-        <p:txBody>
-          <a:bodyPr>
-            <a:normAutofit lnSpcReduction="10000"/>
-          </a:bodyPr>
-          <a:lstStyle/>
-          <a:p>
-            <a:r>
-              <a:rPr lang="en-US" dirty="0"/>
-              <a:t>Nuremberg Code, 1947</a:t>
-            </a:r>
-          </a:p>
-          <a:p>
-            <a:pPr lvl="1"/>
-            <a:r>
-              <a:rPr lang="en-US" dirty="0"/>
-              <a:t>Response to Nazi researchers</a:t>
-            </a:r>
-          </a:p>
-          <a:p>
-            <a:r>
-              <a:rPr lang="en-US" dirty="0"/>
-              <a:t>Declaration of Helsinki, 1964</a:t>
-            </a:r>
-          </a:p>
-          <a:p>
-            <a:pPr lvl="1"/>
-            <a:r>
-              <a:rPr lang="en-US" dirty="0"/>
-              <a:t>Broader statement of principles</a:t>
-            </a:r>
-          </a:p>
-          <a:p>
-            <a:r>
-              <a:rPr lang="en-US" dirty="0"/>
-              <a:t>Belmont Report, 1979</a:t>
-            </a:r>
-          </a:p>
-          <a:p>
-            <a:pPr lvl="1"/>
-            <a:r>
-              <a:rPr lang="en-US" dirty="0"/>
-              <a:t>Respect for persons</a:t>
-            </a:r>
-          </a:p>
-          <a:p>
-            <a:pPr lvl="1"/>
-            <a:r>
-              <a:rPr lang="en-US" dirty="0"/>
-              <a:t>Beneficence</a:t>
-            </a:r>
-          </a:p>
-          <a:p>
-            <a:pPr lvl="1"/>
-            <a:r>
-              <a:rPr lang="en-US" dirty="0"/>
-              <a:t>Justice</a:t>
-            </a:r>
-          </a:p>
-          <a:p>
-            <a:r>
-              <a:rPr lang="en-US" dirty="0"/>
-              <a:t>APA Code of Ethics</a:t>
-            </a:r>
-          </a:p>
-          <a:p>
-            <a:pPr lvl="1"/>
-            <a:r>
-              <a:rPr lang="en-US" dirty="0"/>
-              <a:t>Includes integrity</a:t>
-            </a:r>
-          </a:p>
-        </p:txBody>
-      </p:sp>
-    </p:spTree>
-    <p:extLst>
-      <p:ext uri="{BB962C8B-B14F-4D97-AF65-F5344CB8AC3E}">
-        <p14:creationId xmlns:p14="http://schemas.microsoft.com/office/powerpoint/2010/main" val="3288209274"/>
-      </p:ext>
-    </p:extLst>
-  </p:cSld>
-  <p:clrMapOvr>
-    <a:masterClrMapping/>
-  </p:clrMapOvr>
-</p:sld>
-</file>
-
-<file path=ppt/slides/slide8.xml><?xml version="1.0" encoding="utf-8"?>
-<p:sld xmlns:a="http://schemas.openxmlformats.org/drawingml/2006/main" xmlns:r="http://schemas.openxmlformats.org/officeDocument/2006/relationships" xmlns:p="http://schemas.openxmlformats.org/presentationml/2006/main">
-  <p:cSld>
-    <p:spTree>
-      <p:nvGrpSpPr>
-        <p:cNvPr id="1" name=""/>
-        <p:cNvGrpSpPr/>
-        <p:nvPr/>
-      </p:nvGrpSpPr>
-      <p:grpSpPr>
-        <a:xfrm>
-          <a:off x="0" y="0"/>
-          <a:ext cx="0" cy="0"/>
-          <a:chOff x="0" y="0"/>
-          <a:chExt cx="0" cy="0"/>
-        </a:xfrm>
-      </p:grpSpPr>
-      <p:sp>
-        <p:nvSpPr>
-          <p:cNvPr id="2" name="Title 1">
-            <a:extLst>
-              <a:ext uri="{FF2B5EF4-FFF2-40B4-BE49-F238E27FC236}">
-                <a16:creationId xmlns:a16="http://schemas.microsoft.com/office/drawing/2014/main" id="{C69CA25E-0129-751D-CE09-49BE1BA80101}"/>
-              </a:ext>
-            </a:extLst>
-          </p:cNvPr>
-          <p:cNvSpPr>
-            <a:spLocks noGrp="1"/>
-          </p:cNvSpPr>
-          <p:nvPr>
-            <p:ph type="title"/>
-          </p:nvPr>
-        </p:nvSpPr>
-        <p:spPr/>
-        <p:txBody>
-          <a:bodyPr/>
-          <a:lstStyle/>
-          <a:p>
-            <a:r>
-              <a:rPr lang="en-US" dirty="0"/>
-              <a:t>IRB</a:t>
-            </a:r>
-          </a:p>
-        </p:txBody>
-      </p:sp>
-      <p:sp>
-        <p:nvSpPr>
-          <p:cNvPr id="3" name="Content Placeholder 2">
-            <a:extLst>
-              <a:ext uri="{FF2B5EF4-FFF2-40B4-BE49-F238E27FC236}">
-                <a16:creationId xmlns:a16="http://schemas.microsoft.com/office/drawing/2014/main" id="{49B3DB39-F32C-16FD-0122-2D9A0766B011}"/>
-              </a:ext>
-            </a:extLst>
-          </p:cNvPr>
-          <p:cNvSpPr>
-            <a:spLocks noGrp="1"/>
-          </p:cNvSpPr>
-          <p:nvPr>
-            <p:ph idx="1"/>
-          </p:nvPr>
-        </p:nvSpPr>
-        <p:spPr/>
-        <p:txBody>
-          <a:bodyPr>
-            <a:normAutofit/>
-          </a:bodyPr>
-          <a:lstStyle/>
-          <a:p>
-            <a:r>
-              <a:rPr lang="en-US" dirty="0"/>
-              <a:t>What is the main goal and purpose of the Institutional Review Board?</a:t>
-            </a:r>
-          </a:p>
-        </p:txBody>
-      </p:sp>
-    </p:spTree>
-    <p:extLst>
-      <p:ext uri="{BB962C8B-B14F-4D97-AF65-F5344CB8AC3E}">
-        <p14:creationId xmlns:p14="http://schemas.microsoft.com/office/powerpoint/2010/main" val="2712044758"/>
-      </p:ext>
-    </p:extLst>
-  </p:cSld>
-  <p:clrMapOvr>
-    <a:masterClrMapping/>
-  </p:clrMapOvr>
-</p:sld>
-</file>
-
-<file path=ppt/slides/slide9.xml><?xml version="1.0" encoding="utf-8"?>
-<p:sld xmlns:a="http://schemas.openxmlformats.org/drawingml/2006/main" xmlns:r="http://schemas.openxmlformats.org/officeDocument/2006/relationships" xmlns:p="http://schemas.openxmlformats.org/presentationml/2006/main">
-  <p:cSld>
-    <p:spTree>
-      <p:nvGrpSpPr>
-        <p:cNvPr id="1" name=""/>
-        <p:cNvGrpSpPr/>
-        <p:nvPr/>
-      </p:nvGrpSpPr>
-      <p:grpSpPr>
-        <a:xfrm>
-          <a:off x="0" y="0"/>
-          <a:ext cx="0" cy="0"/>
-          <a:chOff x="0" y="0"/>
-          <a:chExt cx="0" cy="0"/>
-        </a:xfrm>
-      </p:grpSpPr>
-      <p:sp>
-        <p:nvSpPr>
-          <p:cNvPr id="2" name="Title 1">
-            <a:extLst>
-              <a:ext uri="{FF2B5EF4-FFF2-40B4-BE49-F238E27FC236}">
-                <a16:creationId xmlns:a16="http://schemas.microsoft.com/office/drawing/2014/main" id="{FBB9C055-8258-D9A6-EFF9-A989F304FFDB}"/>
-              </a:ext>
-            </a:extLst>
-          </p:cNvPr>
-          <p:cNvSpPr>
-            <a:spLocks noGrp="1"/>
-          </p:cNvSpPr>
-          <p:nvPr>
-            <p:ph type="title"/>
-          </p:nvPr>
-        </p:nvSpPr>
-        <p:spPr/>
-        <p:txBody>
-          <a:bodyPr/>
-          <a:lstStyle/>
-          <a:p>
-            <a:r>
-              <a:rPr lang="en-US" dirty="0"/>
-              <a:t>Informed Consent</a:t>
-            </a:r>
-          </a:p>
-        </p:txBody>
-      </p:sp>
-      <p:sp>
-        <p:nvSpPr>
-          <p:cNvPr id="3" name="Content Placeholder 2">
-            <a:extLst>
-              <a:ext uri="{FF2B5EF4-FFF2-40B4-BE49-F238E27FC236}">
-                <a16:creationId xmlns:a16="http://schemas.microsoft.com/office/drawing/2014/main" id="{409C5025-2D7E-289A-4C93-0D00D1D91BCA}"/>
-              </a:ext>
-            </a:extLst>
-          </p:cNvPr>
-          <p:cNvSpPr>
-            <a:spLocks noGrp="1"/>
-          </p:cNvSpPr>
-          <p:nvPr>
-            <p:ph idx="1"/>
-          </p:nvPr>
-        </p:nvSpPr>
-        <p:spPr/>
-        <p:txBody>
-          <a:bodyPr/>
-          <a:lstStyle/>
-          <a:p>
-            <a:r>
-              <a:rPr lang="en-US" dirty="0"/>
-              <a:t>Before participating in a research experiment, all participants should generally read and sign an informed consent form.  What are 3 main goals of this process intended to maintain ethical standards for the scientific work?</a:t>
-            </a:r>
-          </a:p>
-          <a:p>
-            <a:endParaRPr lang="en-US" dirty="0"/>
-          </a:p>
-        </p:txBody>
-      </p:sp>
-    </p:spTree>
-    <p:extLst>
-      <p:ext uri="{BB962C8B-B14F-4D97-AF65-F5344CB8AC3E}">
-        <p14:creationId xmlns:p14="http://schemas.microsoft.com/office/powerpoint/2010/main" val="3892084121"/>
       </p:ext>
     </p:extLst>
   </p:cSld>

</xml_diff>